<commit_message>
+ Add more tree traversal methods
</commit_message>
<xml_diff>
--- a/cs-seminar/算法与数据结构/树/树.pptx
+++ b/cs-seminar/算法与数据结构/树/树.pptx
@@ -209,7 +209,7 @@
           <a:p>
             <a:fld id="{9C395F08-296D-4F57-99DE-4DE9612FD2E8}" type="datetimeFigureOut">
               <a:rPr lang="zh-CN" altLang="en-US" smtClean="0"/>
-              <a:t>2020/6/6</a:t>
+              <a:t>2020/6/8</a:t>
             </a:fld>
             <a:endParaRPr lang="zh-CN" altLang="en-US"/>
           </a:p>
@@ -273,38 +273,37 @@
           <a:p>
             <a:pPr lvl="0"/>
             <a:r>
-              <a:rPr lang="zh-CN" altLang="en-US" smtClean="0"/>
+              <a:rPr lang="zh-CN" altLang="en-US"/>
               <a:t>单击此处编辑母版文本样式</a:t>
             </a:r>
           </a:p>
           <a:p>
             <a:pPr lvl="1"/>
             <a:r>
-              <a:rPr lang="zh-CN" altLang="en-US" smtClean="0"/>
+              <a:rPr lang="zh-CN" altLang="en-US"/>
               <a:t>第二级</a:t>
             </a:r>
           </a:p>
           <a:p>
             <a:pPr lvl="2"/>
             <a:r>
-              <a:rPr lang="zh-CN" altLang="en-US" smtClean="0"/>
+              <a:rPr lang="zh-CN" altLang="en-US"/>
               <a:t>第三级</a:t>
             </a:r>
           </a:p>
           <a:p>
             <a:pPr lvl="3"/>
             <a:r>
-              <a:rPr lang="zh-CN" altLang="en-US" smtClean="0"/>
+              <a:rPr lang="zh-CN" altLang="en-US"/>
               <a:t>第四级</a:t>
             </a:r>
           </a:p>
           <a:p>
             <a:pPr lvl="4"/>
             <a:r>
-              <a:rPr lang="zh-CN" altLang="en-US" smtClean="0"/>
+              <a:rPr lang="zh-CN" altLang="en-US"/>
               <a:t>第五级</a:t>
             </a:r>
-            <a:endParaRPr lang="zh-CN" altLang="en-US"/>
           </a:p>
         </p:txBody>
       </p:sp>
@@ -524,10 +523,9 @@
           </a:lstStyle>
           <a:p>
             <a:r>
-              <a:rPr lang="zh-CN" altLang="en-US" smtClean="0"/>
+              <a:rPr lang="zh-CN" altLang="en-US"/>
               <a:t>单击此处编辑母版标题样式</a:t>
             </a:r>
-            <a:endParaRPr lang="zh-CN" altLang="en-US"/>
           </a:p>
         </p:txBody>
       </p:sp>
@@ -589,10 +587,9 @@
           </a:lstStyle>
           <a:p>
             <a:r>
-              <a:rPr lang="zh-CN" altLang="en-US" smtClean="0"/>
+              <a:rPr lang="zh-CN" altLang="en-US"/>
               <a:t>单击此处编辑母版副标题样式</a:t>
             </a:r>
-            <a:endParaRPr lang="zh-CN" altLang="en-US"/>
           </a:p>
         </p:txBody>
       </p:sp>
@@ -613,7 +610,7 @@
           <a:p>
             <a:fld id="{70DE98D0-9A98-4B82-9573-1B9E451B3DD8}" type="datetime1">
               <a:rPr lang="zh-CN" altLang="en-US" smtClean="0"/>
-              <a:t>2020/6/6</a:t>
+              <a:t>2020/6/8</a:t>
             </a:fld>
             <a:endParaRPr lang="zh-CN" altLang="en-US"/>
           </a:p>
@@ -635,7 +632,7 @@
           <a:lstStyle/>
           <a:p>
             <a:r>
-              <a:rPr lang="en-US" altLang="zh-CN" smtClean="0"/>
+              <a:rPr lang="en-US" altLang="zh-CN"/>
               <a:t>LTE Phone Number Catcher: A Practical Attack against Mobile Privacy</a:t>
             </a:r>
             <a:endParaRPr lang="zh-CN" altLang="en-US"/>
@@ -711,10 +708,9 @@
           <a:lstStyle/>
           <a:p>
             <a:r>
-              <a:rPr lang="zh-CN" altLang="en-US" smtClean="0"/>
+              <a:rPr lang="zh-CN" altLang="en-US"/>
               <a:t>单击此处编辑母版标题样式</a:t>
             </a:r>
-            <a:endParaRPr lang="zh-CN" altLang="en-US"/>
           </a:p>
         </p:txBody>
       </p:sp>
@@ -735,38 +731,37 @@
           <a:p>
             <a:pPr lvl="0"/>
             <a:r>
-              <a:rPr lang="zh-CN" altLang="en-US" smtClean="0"/>
+              <a:rPr lang="zh-CN" altLang="en-US"/>
               <a:t>单击此处编辑母版文本样式</a:t>
             </a:r>
           </a:p>
           <a:p>
             <a:pPr lvl="1"/>
             <a:r>
-              <a:rPr lang="zh-CN" altLang="en-US" smtClean="0"/>
+              <a:rPr lang="zh-CN" altLang="en-US"/>
               <a:t>第二级</a:t>
             </a:r>
           </a:p>
           <a:p>
             <a:pPr lvl="2"/>
             <a:r>
-              <a:rPr lang="zh-CN" altLang="en-US" smtClean="0"/>
+              <a:rPr lang="zh-CN" altLang="en-US"/>
               <a:t>第三级</a:t>
             </a:r>
           </a:p>
           <a:p>
             <a:pPr lvl="3"/>
             <a:r>
-              <a:rPr lang="zh-CN" altLang="en-US" smtClean="0"/>
+              <a:rPr lang="zh-CN" altLang="en-US"/>
               <a:t>第四级</a:t>
             </a:r>
           </a:p>
           <a:p>
             <a:pPr lvl="4"/>
             <a:r>
-              <a:rPr lang="zh-CN" altLang="en-US" smtClean="0"/>
+              <a:rPr lang="zh-CN" altLang="en-US"/>
               <a:t>第五级</a:t>
             </a:r>
-            <a:endParaRPr lang="zh-CN" altLang="en-US"/>
           </a:p>
         </p:txBody>
       </p:sp>
@@ -787,7 +782,7 @@
           <a:p>
             <a:fld id="{CAD6EDDE-8258-4135-98D1-138C89A7D11F}" type="datetime1">
               <a:rPr lang="zh-CN" altLang="en-US" smtClean="0"/>
-              <a:t>2020/6/6</a:t>
+              <a:t>2020/6/8</a:t>
             </a:fld>
             <a:endParaRPr lang="zh-CN" altLang="en-US"/>
           </a:p>
@@ -809,7 +804,7 @@
           <a:lstStyle/>
           <a:p>
             <a:r>
-              <a:rPr lang="en-US" altLang="zh-CN" smtClean="0"/>
+              <a:rPr lang="en-US" altLang="zh-CN"/>
               <a:t>LTE Phone Number Catcher: A Practical Attack against Mobile Privacy</a:t>
             </a:r>
             <a:endParaRPr lang="zh-CN" altLang="en-US"/>
@@ -890,10 +885,9 @@
           <a:lstStyle/>
           <a:p>
             <a:r>
-              <a:rPr lang="zh-CN" altLang="en-US" smtClean="0"/>
+              <a:rPr lang="zh-CN" altLang="en-US"/>
               <a:t>单击此处编辑母版标题样式</a:t>
             </a:r>
-            <a:endParaRPr lang="zh-CN" altLang="en-US"/>
           </a:p>
         </p:txBody>
       </p:sp>
@@ -919,38 +913,37 @@
           <a:p>
             <a:pPr lvl="0"/>
             <a:r>
-              <a:rPr lang="zh-CN" altLang="en-US" smtClean="0"/>
+              <a:rPr lang="zh-CN" altLang="en-US"/>
               <a:t>单击此处编辑母版文本样式</a:t>
             </a:r>
           </a:p>
           <a:p>
             <a:pPr lvl="1"/>
             <a:r>
-              <a:rPr lang="zh-CN" altLang="en-US" smtClean="0"/>
+              <a:rPr lang="zh-CN" altLang="en-US"/>
               <a:t>第二级</a:t>
             </a:r>
           </a:p>
           <a:p>
             <a:pPr lvl="2"/>
             <a:r>
-              <a:rPr lang="zh-CN" altLang="en-US" smtClean="0"/>
+              <a:rPr lang="zh-CN" altLang="en-US"/>
               <a:t>第三级</a:t>
             </a:r>
           </a:p>
           <a:p>
             <a:pPr lvl="3"/>
             <a:r>
-              <a:rPr lang="zh-CN" altLang="en-US" smtClean="0"/>
+              <a:rPr lang="zh-CN" altLang="en-US"/>
               <a:t>第四级</a:t>
             </a:r>
           </a:p>
           <a:p>
             <a:pPr lvl="4"/>
             <a:r>
-              <a:rPr lang="zh-CN" altLang="en-US" smtClean="0"/>
+              <a:rPr lang="zh-CN" altLang="en-US"/>
               <a:t>第五级</a:t>
             </a:r>
-            <a:endParaRPr lang="zh-CN" altLang="en-US"/>
           </a:p>
         </p:txBody>
       </p:sp>
@@ -971,7 +964,7 @@
           <a:p>
             <a:fld id="{A4F786FF-FC21-41E5-B843-4724DBB978DB}" type="datetime1">
               <a:rPr lang="zh-CN" altLang="en-US" smtClean="0"/>
-              <a:t>2020/6/6</a:t>
+              <a:t>2020/6/8</a:t>
             </a:fld>
             <a:endParaRPr lang="zh-CN" altLang="en-US"/>
           </a:p>
@@ -993,7 +986,7 @@
           <a:lstStyle/>
           <a:p>
             <a:r>
-              <a:rPr lang="en-US" altLang="zh-CN" smtClean="0"/>
+              <a:rPr lang="en-US" altLang="zh-CN"/>
               <a:t>LTE Phone Number Catcher: A Practical Attack against Mobile Privacy</a:t>
             </a:r>
             <a:endParaRPr lang="zh-CN" altLang="en-US"/>
@@ -1083,10 +1076,9 @@
           </a:lstStyle>
           <a:p>
             <a:r>
-              <a:rPr lang="zh-CN" altLang="en-US" smtClean="0"/>
+              <a:rPr lang="zh-CN" altLang="en-US"/>
               <a:t>单击此处编辑母版标题样式</a:t>
             </a:r>
-            <a:endParaRPr lang="zh-CN" altLang="en-US"/>
           </a:p>
         </p:txBody>
       </p:sp>
@@ -1143,38 +1135,37 @@
           <a:p>
             <a:pPr lvl="0"/>
             <a:r>
-              <a:rPr lang="zh-CN" altLang="en-US" dirty="0" smtClean="0"/>
+              <a:rPr lang="zh-CN" altLang="en-US" dirty="0"/>
               <a:t>单击此处编辑母版文本样式</a:t>
             </a:r>
           </a:p>
           <a:p>
             <a:pPr lvl="1"/>
             <a:r>
-              <a:rPr lang="zh-CN" altLang="en-US" dirty="0" smtClean="0"/>
+              <a:rPr lang="zh-CN" altLang="en-US" dirty="0"/>
               <a:t>第二级</a:t>
             </a:r>
           </a:p>
           <a:p>
             <a:pPr lvl="2"/>
             <a:r>
-              <a:rPr lang="zh-CN" altLang="en-US" dirty="0" smtClean="0"/>
+              <a:rPr lang="zh-CN" altLang="en-US" dirty="0"/>
               <a:t>第三级</a:t>
             </a:r>
           </a:p>
           <a:p>
             <a:pPr lvl="3"/>
             <a:r>
-              <a:rPr lang="zh-CN" altLang="en-US" dirty="0" smtClean="0"/>
+              <a:rPr lang="zh-CN" altLang="en-US" dirty="0"/>
               <a:t>第四级</a:t>
             </a:r>
           </a:p>
           <a:p>
             <a:pPr lvl="4"/>
             <a:r>
-              <a:rPr lang="zh-CN" altLang="en-US" dirty="0" smtClean="0"/>
+              <a:rPr lang="zh-CN" altLang="en-US" dirty="0"/>
               <a:t>第五级</a:t>
             </a:r>
-            <a:endParaRPr lang="zh-CN" altLang="en-US" dirty="0"/>
           </a:p>
         </p:txBody>
       </p:sp>
@@ -1209,7 +1200,7 @@
           </a:lstStyle>
           <a:p>
             <a:r>
-              <a:rPr lang="en-US" altLang="zh-CN" smtClean="0"/>
+              <a:rPr lang="en-US" altLang="zh-CN"/>
               <a:t>LTE Phone Number Catcher: A Practical Attack against Mobile Privacy</a:t>
             </a:r>
             <a:endParaRPr lang="zh-CN" altLang="en-US" dirty="0"/>
@@ -1310,10 +1301,9 @@
           </a:lstStyle>
           <a:p>
             <a:r>
-              <a:rPr lang="zh-CN" altLang="en-US" smtClean="0"/>
+              <a:rPr lang="zh-CN" altLang="en-US"/>
               <a:t>单击此处编辑母版标题样式</a:t>
             </a:r>
-            <a:endParaRPr lang="zh-CN" altLang="en-US"/>
           </a:p>
         </p:txBody>
       </p:sp>
@@ -1430,7 +1420,7 @@
           <a:p>
             <a:pPr lvl="0"/>
             <a:r>
-              <a:rPr lang="zh-CN" altLang="en-US" smtClean="0"/>
+              <a:rPr lang="zh-CN" altLang="en-US"/>
               <a:t>单击此处编辑母版文本样式</a:t>
             </a:r>
           </a:p>
@@ -1453,7 +1443,7 @@
           <a:p>
             <a:fld id="{6A3DF257-FFF4-43D3-A734-023879B918D0}" type="datetime1">
               <a:rPr lang="zh-CN" altLang="en-US" smtClean="0"/>
-              <a:t>2020/6/6</a:t>
+              <a:t>2020/6/8</a:t>
             </a:fld>
             <a:endParaRPr lang="zh-CN" altLang="en-US"/>
           </a:p>
@@ -1475,7 +1465,7 @@
           <a:lstStyle/>
           <a:p>
             <a:r>
-              <a:rPr lang="en-US" altLang="zh-CN" smtClean="0"/>
+              <a:rPr lang="en-US" altLang="zh-CN"/>
               <a:t>LTE Phone Number Catcher: A Practical Attack against Mobile Privacy</a:t>
             </a:r>
             <a:endParaRPr lang="zh-CN" altLang="en-US"/>
@@ -1551,10 +1541,9 @@
           <a:lstStyle/>
           <a:p>
             <a:r>
-              <a:rPr lang="zh-CN" altLang="en-US" smtClean="0"/>
+              <a:rPr lang="zh-CN" altLang="en-US"/>
               <a:t>单击此处编辑母版标题样式</a:t>
             </a:r>
-            <a:endParaRPr lang="zh-CN" altLang="en-US"/>
           </a:p>
         </p:txBody>
       </p:sp>
@@ -1580,38 +1569,37 @@
           <a:p>
             <a:pPr lvl="0"/>
             <a:r>
-              <a:rPr lang="zh-CN" altLang="en-US" smtClean="0"/>
+              <a:rPr lang="zh-CN" altLang="en-US"/>
               <a:t>单击此处编辑母版文本样式</a:t>
             </a:r>
           </a:p>
           <a:p>
             <a:pPr lvl="1"/>
             <a:r>
-              <a:rPr lang="zh-CN" altLang="en-US" smtClean="0"/>
+              <a:rPr lang="zh-CN" altLang="en-US"/>
               <a:t>第二级</a:t>
             </a:r>
           </a:p>
           <a:p>
             <a:pPr lvl="2"/>
             <a:r>
-              <a:rPr lang="zh-CN" altLang="en-US" smtClean="0"/>
+              <a:rPr lang="zh-CN" altLang="en-US"/>
               <a:t>第三级</a:t>
             </a:r>
           </a:p>
           <a:p>
             <a:pPr lvl="3"/>
             <a:r>
-              <a:rPr lang="zh-CN" altLang="en-US" smtClean="0"/>
+              <a:rPr lang="zh-CN" altLang="en-US"/>
               <a:t>第四级</a:t>
             </a:r>
           </a:p>
           <a:p>
             <a:pPr lvl="4"/>
             <a:r>
-              <a:rPr lang="zh-CN" altLang="en-US" smtClean="0"/>
+              <a:rPr lang="zh-CN" altLang="en-US"/>
               <a:t>第五级</a:t>
             </a:r>
-            <a:endParaRPr lang="zh-CN" altLang="en-US"/>
           </a:p>
         </p:txBody>
       </p:sp>
@@ -1637,38 +1625,37 @@
           <a:p>
             <a:pPr lvl="0"/>
             <a:r>
-              <a:rPr lang="zh-CN" altLang="en-US" smtClean="0"/>
+              <a:rPr lang="zh-CN" altLang="en-US"/>
               <a:t>单击此处编辑母版文本样式</a:t>
             </a:r>
           </a:p>
           <a:p>
             <a:pPr lvl="1"/>
             <a:r>
-              <a:rPr lang="zh-CN" altLang="en-US" smtClean="0"/>
+              <a:rPr lang="zh-CN" altLang="en-US"/>
               <a:t>第二级</a:t>
             </a:r>
           </a:p>
           <a:p>
             <a:pPr lvl="2"/>
             <a:r>
-              <a:rPr lang="zh-CN" altLang="en-US" smtClean="0"/>
+              <a:rPr lang="zh-CN" altLang="en-US"/>
               <a:t>第三级</a:t>
             </a:r>
           </a:p>
           <a:p>
             <a:pPr lvl="3"/>
             <a:r>
-              <a:rPr lang="zh-CN" altLang="en-US" smtClean="0"/>
+              <a:rPr lang="zh-CN" altLang="en-US"/>
               <a:t>第四级</a:t>
             </a:r>
           </a:p>
           <a:p>
             <a:pPr lvl="4"/>
             <a:r>
-              <a:rPr lang="zh-CN" altLang="en-US" smtClean="0"/>
+              <a:rPr lang="zh-CN" altLang="en-US"/>
               <a:t>第五级</a:t>
             </a:r>
-            <a:endParaRPr lang="zh-CN" altLang="en-US"/>
           </a:p>
         </p:txBody>
       </p:sp>
@@ -1689,7 +1676,7 @@
           <a:p>
             <a:fld id="{558E8501-F9B5-4D99-BE36-F931E4F74C2A}" type="datetime1">
               <a:rPr lang="zh-CN" altLang="en-US" smtClean="0"/>
-              <a:t>2020/6/6</a:t>
+              <a:t>2020/6/8</a:t>
             </a:fld>
             <a:endParaRPr lang="zh-CN" altLang="en-US"/>
           </a:p>
@@ -1711,7 +1698,7 @@
           <a:lstStyle/>
           <a:p>
             <a:r>
-              <a:rPr lang="en-US" altLang="zh-CN" smtClean="0"/>
+              <a:rPr lang="en-US" altLang="zh-CN"/>
               <a:t>LTE Phone Number Catcher: A Practical Attack against Mobile Privacy</a:t>
             </a:r>
             <a:endParaRPr lang="zh-CN" altLang="en-US"/>
@@ -1792,10 +1779,9 @@
           <a:lstStyle/>
           <a:p>
             <a:r>
-              <a:rPr lang="zh-CN" altLang="en-US" smtClean="0"/>
+              <a:rPr lang="zh-CN" altLang="en-US"/>
               <a:t>单击此处编辑母版标题样式</a:t>
             </a:r>
-            <a:endParaRPr lang="zh-CN" altLang="en-US"/>
           </a:p>
         </p:txBody>
       </p:sp>
@@ -1858,7 +1844,7 @@
           <a:p>
             <a:pPr lvl="0"/>
             <a:r>
-              <a:rPr lang="zh-CN" altLang="en-US" smtClean="0"/>
+              <a:rPr lang="zh-CN" altLang="en-US"/>
               <a:t>单击此处编辑母版文本样式</a:t>
             </a:r>
           </a:p>
@@ -1886,38 +1872,37 @@
           <a:p>
             <a:pPr lvl="0"/>
             <a:r>
-              <a:rPr lang="zh-CN" altLang="en-US" smtClean="0"/>
+              <a:rPr lang="zh-CN" altLang="en-US"/>
               <a:t>单击此处编辑母版文本样式</a:t>
             </a:r>
           </a:p>
           <a:p>
             <a:pPr lvl="1"/>
             <a:r>
-              <a:rPr lang="zh-CN" altLang="en-US" smtClean="0"/>
+              <a:rPr lang="zh-CN" altLang="en-US"/>
               <a:t>第二级</a:t>
             </a:r>
           </a:p>
           <a:p>
             <a:pPr lvl="2"/>
             <a:r>
-              <a:rPr lang="zh-CN" altLang="en-US" smtClean="0"/>
+              <a:rPr lang="zh-CN" altLang="en-US"/>
               <a:t>第三级</a:t>
             </a:r>
           </a:p>
           <a:p>
             <a:pPr lvl="3"/>
             <a:r>
-              <a:rPr lang="zh-CN" altLang="en-US" smtClean="0"/>
+              <a:rPr lang="zh-CN" altLang="en-US"/>
               <a:t>第四级</a:t>
             </a:r>
           </a:p>
           <a:p>
             <a:pPr lvl="4"/>
             <a:r>
-              <a:rPr lang="zh-CN" altLang="en-US" smtClean="0"/>
+              <a:rPr lang="zh-CN" altLang="en-US"/>
               <a:t>第五级</a:t>
             </a:r>
-            <a:endParaRPr lang="zh-CN" altLang="en-US"/>
           </a:p>
         </p:txBody>
       </p:sp>
@@ -1980,7 +1965,7 @@
           <a:p>
             <a:pPr lvl="0"/>
             <a:r>
-              <a:rPr lang="zh-CN" altLang="en-US" smtClean="0"/>
+              <a:rPr lang="zh-CN" altLang="en-US"/>
               <a:t>单击此处编辑母版文本样式</a:t>
             </a:r>
           </a:p>
@@ -2008,38 +1993,37 @@
           <a:p>
             <a:pPr lvl="0"/>
             <a:r>
-              <a:rPr lang="zh-CN" altLang="en-US" smtClean="0"/>
+              <a:rPr lang="zh-CN" altLang="en-US"/>
               <a:t>单击此处编辑母版文本样式</a:t>
             </a:r>
           </a:p>
           <a:p>
             <a:pPr lvl="1"/>
             <a:r>
-              <a:rPr lang="zh-CN" altLang="en-US" smtClean="0"/>
+              <a:rPr lang="zh-CN" altLang="en-US"/>
               <a:t>第二级</a:t>
             </a:r>
           </a:p>
           <a:p>
             <a:pPr lvl="2"/>
             <a:r>
-              <a:rPr lang="zh-CN" altLang="en-US" smtClean="0"/>
+              <a:rPr lang="zh-CN" altLang="en-US"/>
               <a:t>第三级</a:t>
             </a:r>
           </a:p>
           <a:p>
             <a:pPr lvl="3"/>
             <a:r>
-              <a:rPr lang="zh-CN" altLang="en-US" smtClean="0"/>
+              <a:rPr lang="zh-CN" altLang="en-US"/>
               <a:t>第四级</a:t>
             </a:r>
           </a:p>
           <a:p>
             <a:pPr lvl="4"/>
             <a:r>
-              <a:rPr lang="zh-CN" altLang="en-US" smtClean="0"/>
+              <a:rPr lang="zh-CN" altLang="en-US"/>
               <a:t>第五级</a:t>
             </a:r>
-            <a:endParaRPr lang="zh-CN" altLang="en-US"/>
           </a:p>
         </p:txBody>
       </p:sp>
@@ -2060,7 +2044,7 @@
           <a:p>
             <a:fld id="{290F56E6-87CB-4499-B353-DB44E8B6FDF1}" type="datetime1">
               <a:rPr lang="zh-CN" altLang="en-US" smtClean="0"/>
-              <a:t>2020/6/6</a:t>
+              <a:t>2020/6/8</a:t>
             </a:fld>
             <a:endParaRPr lang="zh-CN" altLang="en-US"/>
           </a:p>
@@ -2082,7 +2066,7 @@
           <a:lstStyle/>
           <a:p>
             <a:r>
-              <a:rPr lang="en-US" altLang="zh-CN" smtClean="0"/>
+              <a:rPr lang="en-US" altLang="zh-CN"/>
               <a:t>LTE Phone Number Catcher: A Practical Attack against Mobile Privacy</a:t>
             </a:r>
             <a:endParaRPr lang="zh-CN" altLang="en-US"/>
@@ -2158,10 +2142,9 @@
           <a:lstStyle/>
           <a:p>
             <a:r>
-              <a:rPr lang="zh-CN" altLang="en-US" smtClean="0"/>
+              <a:rPr lang="zh-CN" altLang="en-US"/>
               <a:t>单击此处编辑母版标题样式</a:t>
             </a:r>
-            <a:endParaRPr lang="zh-CN" altLang="en-US"/>
           </a:p>
         </p:txBody>
       </p:sp>
@@ -2182,7 +2165,7 @@
           <a:p>
             <a:fld id="{3ADCBD56-D48A-4982-A9C5-6E7E68182A52}" type="datetime1">
               <a:rPr lang="zh-CN" altLang="en-US" smtClean="0"/>
-              <a:t>2020/6/6</a:t>
+              <a:t>2020/6/8</a:t>
             </a:fld>
             <a:endParaRPr lang="zh-CN" altLang="en-US"/>
           </a:p>
@@ -2204,7 +2187,7 @@
           <a:lstStyle/>
           <a:p>
             <a:r>
-              <a:rPr lang="en-US" altLang="zh-CN" smtClean="0"/>
+              <a:rPr lang="en-US" altLang="zh-CN"/>
               <a:t>LTE Phone Number Catcher: A Practical Attack against Mobile Privacy</a:t>
             </a:r>
             <a:endParaRPr lang="zh-CN" altLang="en-US"/>
@@ -2281,7 +2264,7 @@
           <a:p>
             <a:fld id="{BE83D10E-741F-4194-B7A0-87FEF338E493}" type="datetime1">
               <a:rPr lang="zh-CN" altLang="en-US" smtClean="0"/>
-              <a:t>2020/6/6</a:t>
+              <a:t>2020/6/8</a:t>
             </a:fld>
             <a:endParaRPr lang="zh-CN" altLang="en-US"/>
           </a:p>
@@ -2303,7 +2286,7 @@
           <a:lstStyle/>
           <a:p>
             <a:r>
-              <a:rPr lang="en-US" altLang="zh-CN" smtClean="0"/>
+              <a:rPr lang="en-US" altLang="zh-CN"/>
               <a:t>LTE Phone Number Catcher: A Practical Attack against Mobile Privacy</a:t>
             </a:r>
             <a:endParaRPr lang="zh-CN" altLang="en-US"/>
@@ -2388,10 +2371,9 @@
           </a:lstStyle>
           <a:p>
             <a:r>
-              <a:rPr lang="zh-CN" altLang="en-US" smtClean="0"/>
+              <a:rPr lang="zh-CN" altLang="en-US"/>
               <a:t>单击此处编辑母版标题样式</a:t>
             </a:r>
-            <a:endParaRPr lang="zh-CN" altLang="en-US"/>
           </a:p>
         </p:txBody>
       </p:sp>
@@ -2445,38 +2427,37 @@
           <a:p>
             <a:pPr lvl="0"/>
             <a:r>
-              <a:rPr lang="zh-CN" altLang="en-US" smtClean="0"/>
+              <a:rPr lang="zh-CN" altLang="en-US"/>
               <a:t>单击此处编辑母版文本样式</a:t>
             </a:r>
           </a:p>
           <a:p>
             <a:pPr lvl="1"/>
             <a:r>
-              <a:rPr lang="zh-CN" altLang="en-US" smtClean="0"/>
+              <a:rPr lang="zh-CN" altLang="en-US"/>
               <a:t>第二级</a:t>
             </a:r>
           </a:p>
           <a:p>
             <a:pPr lvl="2"/>
             <a:r>
-              <a:rPr lang="zh-CN" altLang="en-US" smtClean="0"/>
+              <a:rPr lang="zh-CN" altLang="en-US"/>
               <a:t>第三级</a:t>
             </a:r>
           </a:p>
           <a:p>
             <a:pPr lvl="3"/>
             <a:r>
-              <a:rPr lang="zh-CN" altLang="en-US" smtClean="0"/>
+              <a:rPr lang="zh-CN" altLang="en-US"/>
               <a:t>第四级</a:t>
             </a:r>
           </a:p>
           <a:p>
             <a:pPr lvl="4"/>
             <a:r>
-              <a:rPr lang="zh-CN" altLang="en-US" smtClean="0"/>
+              <a:rPr lang="zh-CN" altLang="en-US"/>
               <a:t>第五级</a:t>
             </a:r>
-            <a:endParaRPr lang="zh-CN" altLang="en-US"/>
           </a:p>
         </p:txBody>
       </p:sp>
@@ -2539,7 +2520,7 @@
           <a:p>
             <a:pPr lvl="0"/>
             <a:r>
-              <a:rPr lang="zh-CN" altLang="en-US" smtClean="0"/>
+              <a:rPr lang="zh-CN" altLang="en-US"/>
               <a:t>单击此处编辑母版文本样式</a:t>
             </a:r>
           </a:p>
@@ -2562,7 +2543,7 @@
           <a:p>
             <a:fld id="{3BDB64AC-4CDF-4D37-8EE1-BC1891535049}" type="datetime1">
               <a:rPr lang="zh-CN" altLang="en-US" smtClean="0"/>
-              <a:t>2020/6/6</a:t>
+              <a:t>2020/6/8</a:t>
             </a:fld>
             <a:endParaRPr lang="zh-CN" altLang="en-US"/>
           </a:p>
@@ -2584,7 +2565,7 @@
           <a:lstStyle/>
           <a:p>
             <a:r>
-              <a:rPr lang="en-US" altLang="zh-CN" smtClean="0"/>
+              <a:rPr lang="en-US" altLang="zh-CN"/>
               <a:t>LTE Phone Number Catcher: A Practical Attack against Mobile Privacy</a:t>
             </a:r>
             <a:endParaRPr lang="zh-CN" altLang="en-US"/>
@@ -2669,10 +2650,9 @@
           </a:lstStyle>
           <a:p>
             <a:r>
-              <a:rPr lang="zh-CN" altLang="en-US" smtClean="0"/>
+              <a:rPr lang="zh-CN" altLang="en-US"/>
               <a:t>单击此处编辑母版标题样式</a:t>
             </a:r>
-            <a:endParaRPr lang="zh-CN" altLang="en-US"/>
           </a:p>
         </p:txBody>
       </p:sp>
@@ -2796,7 +2776,7 @@
           <a:p>
             <a:pPr lvl="0"/>
             <a:r>
-              <a:rPr lang="zh-CN" altLang="en-US" smtClean="0"/>
+              <a:rPr lang="zh-CN" altLang="en-US"/>
               <a:t>单击此处编辑母版文本样式</a:t>
             </a:r>
           </a:p>
@@ -2819,7 +2799,7 @@
           <a:p>
             <a:fld id="{A57B5AE3-5035-4FBD-9579-809DCC9BC55E}" type="datetime1">
               <a:rPr lang="zh-CN" altLang="en-US" smtClean="0"/>
-              <a:t>2020/6/6</a:t>
+              <a:t>2020/6/8</a:t>
             </a:fld>
             <a:endParaRPr lang="zh-CN" altLang="en-US"/>
           </a:p>
@@ -2841,7 +2821,7 @@
           <a:lstStyle/>
           <a:p>
             <a:r>
-              <a:rPr lang="en-US" altLang="zh-CN" smtClean="0"/>
+              <a:rPr lang="en-US" altLang="zh-CN"/>
               <a:t>LTE Phone Number Catcher: A Practical Attack against Mobile Privacy</a:t>
             </a:r>
             <a:endParaRPr lang="zh-CN" altLang="en-US"/>
@@ -2932,10 +2912,9 @@
           <a:lstStyle/>
           <a:p>
             <a:r>
-              <a:rPr lang="zh-CN" altLang="en-US" smtClean="0"/>
+              <a:rPr lang="zh-CN" altLang="en-US"/>
               <a:t>单击此处编辑母版标题样式</a:t>
             </a:r>
-            <a:endParaRPr lang="zh-CN" altLang="en-US"/>
           </a:p>
         </p:txBody>
       </p:sp>
@@ -2966,38 +2945,37 @@
           <a:p>
             <a:pPr lvl="0"/>
             <a:r>
-              <a:rPr lang="zh-CN" altLang="en-US" smtClean="0"/>
+              <a:rPr lang="zh-CN" altLang="en-US"/>
               <a:t>单击此处编辑母版文本样式</a:t>
             </a:r>
           </a:p>
           <a:p>
             <a:pPr lvl="1"/>
             <a:r>
-              <a:rPr lang="zh-CN" altLang="en-US" smtClean="0"/>
+              <a:rPr lang="zh-CN" altLang="en-US"/>
               <a:t>第二级</a:t>
             </a:r>
           </a:p>
           <a:p>
             <a:pPr lvl="2"/>
             <a:r>
-              <a:rPr lang="zh-CN" altLang="en-US" smtClean="0"/>
+              <a:rPr lang="zh-CN" altLang="en-US"/>
               <a:t>第三级</a:t>
             </a:r>
           </a:p>
           <a:p>
             <a:pPr lvl="3"/>
             <a:r>
-              <a:rPr lang="zh-CN" altLang="en-US" smtClean="0"/>
+              <a:rPr lang="zh-CN" altLang="en-US"/>
               <a:t>第四级</a:t>
             </a:r>
           </a:p>
           <a:p>
             <a:pPr lvl="4"/>
             <a:r>
-              <a:rPr lang="zh-CN" altLang="en-US" smtClean="0"/>
+              <a:rPr lang="zh-CN" altLang="en-US"/>
               <a:t>第五级</a:t>
             </a:r>
-            <a:endParaRPr lang="zh-CN" altLang="en-US"/>
           </a:p>
         </p:txBody>
       </p:sp>
@@ -3036,7 +3014,7 @@
           <a:p>
             <a:fld id="{9FF488AB-DBA9-432E-8968-8C1072E4CA37}" type="datetime1">
               <a:rPr lang="zh-CN" altLang="en-US" smtClean="0"/>
-              <a:t>2020/6/6</a:t>
+              <a:t>2020/6/8</a:t>
             </a:fld>
             <a:endParaRPr lang="zh-CN" altLang="en-US"/>
           </a:p>
@@ -3076,7 +3054,7 @@
           </a:lstStyle>
           <a:p>
             <a:r>
-              <a:rPr lang="en-US" altLang="zh-CN" smtClean="0"/>
+              <a:rPr lang="en-US" altLang="zh-CN"/>
               <a:t>LTE Phone Number Catcher: A Practical Attack against Mobile Privacy</a:t>
             </a:r>
             <a:endParaRPr lang="zh-CN" altLang="en-US"/>
@@ -3462,10 +3440,9 @@
           <a:lstStyle/>
           <a:p>
             <a:r>
-              <a:rPr lang="zh-CN" altLang="en-US" dirty="0" smtClean="0"/>
+              <a:rPr lang="zh-CN" altLang="en-US" dirty="0"/>
               <a:t>树</a:t>
             </a:r>
-            <a:endParaRPr lang="zh-CN" altLang="en-US" dirty="0"/>
           </a:p>
         </p:txBody>
       </p:sp>
@@ -3485,20 +3462,20 @@
           <a:lstStyle/>
           <a:p>
             <a:r>
-              <a:rPr lang="zh-CN" altLang="en-US" dirty="0" smtClean="0">
+              <a:rPr lang="zh-CN" altLang="en-US" dirty="0">
                 <a:latin typeface="等线" panose="02010600030101010101" pitchFamily="2" charset="-122"/>
                 <a:ea typeface="等线" panose="02010600030101010101" pitchFamily="2" charset="-122"/>
               </a:rPr>
               <a:t>计算机研讨会</a:t>
             </a:r>
-            <a:endParaRPr lang="en-US" altLang="zh-CN" dirty="0" smtClean="0">
+            <a:endParaRPr lang="en-US" altLang="zh-CN" dirty="0">
               <a:latin typeface="等线" panose="02010600030101010101" pitchFamily="2" charset="-122"/>
               <a:ea typeface="等线" panose="02010600030101010101" pitchFamily="2" charset="-122"/>
             </a:endParaRPr>
           </a:p>
           <a:p>
             <a:r>
-              <a:rPr lang="en-US" altLang="zh-CN" dirty="0" err="1" smtClean="0">
+              <a:rPr lang="en-US" altLang="zh-CN" dirty="0" err="1">
                 <a:latin typeface="等线" panose="02010600030101010101" pitchFamily="2" charset="-122"/>
                 <a:ea typeface="等线" panose="02010600030101010101" pitchFamily="2" charset="-122"/>
               </a:rPr>
@@ -3511,7 +3488,7 @@
           </a:p>
           <a:p>
             <a:r>
-              <a:rPr lang="en-US" altLang="zh-CN" dirty="0" smtClean="0">
+              <a:rPr lang="en-US" altLang="zh-CN" dirty="0">
                 <a:latin typeface="等线" panose="02010600030101010101" pitchFamily="2" charset="-122"/>
                 <a:ea typeface="等线" panose="02010600030101010101" pitchFamily="2" charset="-122"/>
               </a:rPr>
@@ -3534,13 +3511,6 @@
   <p:clrMapOvr>
     <a:masterClrMapping/>
   </p:clrMapOvr>
-  <p:timing>
-    <p:tnLst>
-      <p:par>
-        <p:cTn id="1" dur="indefinite" restart="never" nodeType="tmRoot"/>
-      </p:par>
-    </p:tnLst>
-  </p:timing>
 </p:sld>
 </file>
 
@@ -3577,10 +3547,9 @@
           <a:lstStyle/>
           <a:p>
             <a:r>
-              <a:rPr lang="zh-CN" altLang="en-US" dirty="0" smtClean="0"/>
+              <a:rPr lang="zh-CN" altLang="en-US" dirty="0"/>
               <a:t>下次预告</a:t>
             </a:r>
-            <a:endParaRPr lang="zh-CN" altLang="en-US" dirty="0"/>
           </a:p>
         </p:txBody>
       </p:sp>
@@ -3600,24 +3569,47 @@
           <a:lstStyle/>
           <a:p>
             <a:r>
-              <a:rPr lang="zh-CN" altLang="en-US" dirty="0" smtClean="0"/>
-              <a:t>后序遍历的单栈实现、莫里斯</a:t>
-            </a:r>
-            <a:endParaRPr lang="en-US" altLang="zh-CN" dirty="0" smtClean="0"/>
-          </a:p>
-          <a:p>
-            <a:r>
-              <a:rPr lang="zh-CN" altLang="en-US" dirty="0" smtClean="0"/>
+              <a:rPr lang="zh-CN" altLang="en-US" dirty="0"/>
+              <a:t>后序遍历的单栈实现（两次</a:t>
+            </a:r>
+            <a:r>
+              <a:rPr lang="en-US" altLang="zh-CN" dirty="0"/>
+              <a:t>push</a:t>
+            </a:r>
+            <a:r>
+              <a:rPr lang="zh-CN" altLang="en-US" dirty="0"/>
+              <a:t>或记录</a:t>
+            </a:r>
+            <a:r>
+              <a:rPr lang="en-US" altLang="zh-CN" dirty="0"/>
+              <a:t>last</a:t>
+            </a:r>
+            <a:r>
+              <a:rPr lang="zh-CN" altLang="en-US" dirty="0"/>
+              <a:t>）、</a:t>
+            </a:r>
+            <a:r>
+              <a:rPr lang="zh-CN" altLang="en-US" strike="sngStrike" dirty="0"/>
+              <a:t>莫里斯、</a:t>
+            </a:r>
+            <a:r>
+              <a:rPr lang="zh-CN" altLang="en-US" dirty="0"/>
+              <a:t>无序表</a:t>
+            </a:r>
+            <a:endParaRPr lang="en-US" altLang="zh-CN" dirty="0"/>
+          </a:p>
+          <a:p>
+            <a:r>
+              <a:rPr lang="zh-CN" altLang="en-US" dirty="0"/>
               <a:t>前序的莫里斯</a:t>
             </a:r>
-            <a:endParaRPr lang="en-US" altLang="zh-CN" dirty="0" smtClean="0"/>
-          </a:p>
-          <a:p>
-            <a:r>
-              <a:rPr lang="zh-CN" altLang="en-US" dirty="0" smtClean="0"/>
+            <a:endParaRPr lang="en-US" altLang="zh-CN" dirty="0"/>
+          </a:p>
+          <a:p>
+            <a:r>
+              <a:rPr lang="zh-CN" altLang="en-US" dirty="0"/>
               <a:t>中序的栈实现</a:t>
             </a:r>
-            <a:endParaRPr lang="zh-CN" altLang="en-US" dirty="0"/>
           </a:p>
         </p:txBody>
       </p:sp>
@@ -3655,13 +3647,6 @@
   <p:clrMapOvr>
     <a:masterClrMapping/>
   </p:clrMapOvr>
-  <p:timing>
-    <p:tnLst>
-      <p:par>
-        <p:cTn id="1" dur="indefinite" restart="never" nodeType="tmRoot"/>
-      </p:par>
-    </p:tnLst>
-  </p:timing>
 </p:sld>
 </file>
 
@@ -3698,18 +3683,17 @@
           <a:lstStyle/>
           <a:p>
             <a:r>
-              <a:rPr lang="zh-CN" altLang="en-US" dirty="0" smtClean="0"/>
+              <a:rPr lang="zh-CN" altLang="en-US" dirty="0"/>
               <a:t>深搜 </a:t>
             </a:r>
             <a:r>
-              <a:rPr lang="en-US" altLang="zh-CN" dirty="0" smtClean="0"/>
+              <a:rPr lang="en-US" altLang="zh-CN" dirty="0"/>
               <a:t>vs </a:t>
             </a:r>
             <a:r>
-              <a:rPr lang="zh-CN" altLang="en-US" dirty="0" smtClean="0"/>
+              <a:rPr lang="zh-CN" altLang="en-US" dirty="0"/>
               <a:t>广搜</a:t>
             </a:r>
-            <a:endParaRPr lang="zh-CN" altLang="en-US" dirty="0"/>
           </a:p>
         </p:txBody>
       </p:sp>
@@ -3766,21 +3750,6 @@
   <p:clrMapOvr>
     <a:masterClrMapping/>
   </p:clrMapOvr>
-  <mc:AlternateContent xmlns:mc="http://schemas.openxmlformats.org/markup-compatibility/2006" xmlns:p14="http://schemas.microsoft.com/office/powerpoint/2010/main">
-    <mc:Choice Requires="p14">
-      <p:transition spd="slow" p14:dur="2000"/>
-    </mc:Choice>
-    <mc:Fallback xmlns="">
-      <p:transition spd="slow"/>
-    </mc:Fallback>
-  </mc:AlternateContent>
-  <p:timing>
-    <p:tnLst>
-      <p:par>
-        <p:cTn id="1" dur="indefinite" restart="never" nodeType="tmRoot"/>
-      </p:par>
-    </p:tnLst>
-  </p:timing>
 </p:sld>
 </file>
 
@@ -3817,10 +3786,9 @@
           <a:lstStyle/>
           <a:p>
             <a:r>
-              <a:rPr lang="zh-CN" altLang="en-US" dirty="0" smtClean="0"/>
+              <a:rPr lang="zh-CN" altLang="en-US" dirty="0"/>
               <a:t>层次遍历</a:t>
             </a:r>
-            <a:endParaRPr lang="zh-CN" altLang="en-US" dirty="0"/>
           </a:p>
         </p:txBody>
       </p:sp>
@@ -3877,13 +3845,6 @@
   <p:clrMapOvr>
     <a:masterClrMapping/>
   </p:clrMapOvr>
-  <p:timing>
-    <p:tnLst>
-      <p:par>
-        <p:cTn id="1" dur="indefinite" restart="never" nodeType="tmRoot"/>
-      </p:par>
-    </p:tnLst>
-  </p:timing>
 </p:sld>
 </file>
 
@@ -3920,10 +3881,9 @@
           <a:lstStyle/>
           <a:p>
             <a:r>
-              <a:rPr lang="zh-CN" altLang="en-US" dirty="0" smtClean="0"/>
+              <a:rPr lang="zh-CN" altLang="en-US" dirty="0"/>
               <a:t>例题选讲</a:t>
             </a:r>
-            <a:endParaRPr lang="zh-CN" altLang="en-US" dirty="0"/>
           </a:p>
         </p:txBody>
       </p:sp>
@@ -4016,10 +3976,9 @@
           <a:lstStyle/>
           <a:p>
             <a:r>
-              <a:rPr lang="zh-CN" altLang="en-US" dirty="0" smtClean="0"/>
+              <a:rPr lang="zh-CN" altLang="en-US" dirty="0"/>
               <a:t>学习资源</a:t>
             </a:r>
-            <a:endParaRPr lang="zh-CN" altLang="en-US" dirty="0"/>
           </a:p>
         </p:txBody>
       </p:sp>
@@ -4046,83 +4005,59 @@
           <a:lstStyle/>
           <a:p>
             <a:r>
-              <a:rPr lang="zh-CN" altLang="en-US" dirty="0" smtClean="0"/>
+              <a:rPr lang="zh-CN" altLang="en-US" dirty="0"/>
               <a:t>教材：看教材也就图一乐，真要学技术还得多刷题</a:t>
             </a:r>
-            <a:endParaRPr lang="en-US" altLang="zh-CN" dirty="0" smtClean="0"/>
+            <a:endParaRPr lang="en-US" altLang="zh-CN" dirty="0"/>
           </a:p>
           <a:p>
             <a:pPr lvl="1"/>
             <a:r>
-              <a:rPr lang="en-US" altLang="zh-CN" dirty="0" smtClean="0"/>
+              <a:rPr lang="en-US" altLang="zh-CN" dirty="0"/>
               <a:t>《</a:t>
             </a:r>
             <a:r>
-              <a:rPr lang="zh-CN" altLang="en-US" dirty="0" smtClean="0"/>
+              <a:rPr lang="zh-CN" altLang="en-US" dirty="0"/>
               <a:t>算法导论</a:t>
             </a:r>
             <a:r>
-              <a:rPr lang="en-US" altLang="zh-CN" dirty="0" smtClean="0"/>
+              <a:rPr lang="en-US" altLang="zh-CN" dirty="0"/>
               <a:t>》</a:t>
             </a:r>
             <a:r>
-              <a:rPr lang="zh-CN" altLang="en-US" dirty="0" smtClean="0"/>
-              <a:t>：</a:t>
-            </a:r>
-            <a:r>
-              <a:rPr lang="zh-CN" altLang="en-US" dirty="0"/>
-              <a:t>很</a:t>
-            </a:r>
-            <a:r>
-              <a:rPr lang="zh-CN" altLang="en-US" dirty="0" smtClean="0"/>
-              <a:t>硬</a:t>
-            </a:r>
-            <a:r>
-              <a:rPr lang="zh-CN" altLang="en-US" dirty="0"/>
-              <a:t>核，数学推导和证明挺多，非常重视底层实现</a:t>
-            </a:r>
-            <a:r>
-              <a:rPr lang="zh-CN" altLang="en-US" dirty="0" smtClean="0"/>
-              <a:t>原理</a:t>
-            </a:r>
-            <a:endParaRPr lang="en-US" altLang="zh-CN" dirty="0" smtClean="0"/>
+              <a:rPr lang="zh-CN" altLang="en-US" dirty="0"/>
+              <a:t>：很硬核，数学推导和证明挺多，非常重视底层实现原理</a:t>
+            </a:r>
+            <a:endParaRPr lang="en-US" altLang="zh-CN" dirty="0"/>
           </a:p>
           <a:p>
             <a:pPr lvl="1"/>
             <a:r>
-              <a:rPr lang="en-US" altLang="zh-CN" dirty="0" smtClean="0"/>
+              <a:rPr lang="en-US" altLang="zh-CN" dirty="0"/>
               <a:t>《</a:t>
             </a:r>
             <a:r>
-              <a:rPr lang="zh-CN" altLang="en-US" dirty="0" smtClean="0"/>
+              <a:rPr lang="zh-CN" altLang="en-US" dirty="0"/>
               <a:t>算法</a:t>
             </a:r>
             <a:r>
-              <a:rPr lang="en-US" altLang="zh-CN" dirty="0" smtClean="0"/>
+              <a:rPr lang="en-US" altLang="zh-CN" dirty="0"/>
               <a:t>》</a:t>
             </a:r>
             <a:r>
               <a:rPr lang="zh-CN" altLang="en-US" dirty="0"/>
-              <a:t>：</a:t>
-            </a:r>
-            <a:r>
-              <a:rPr lang="zh-CN" altLang="en-US" dirty="0" smtClean="0"/>
-              <a:t>“树”的部分</a:t>
-            </a:r>
-            <a:r>
-              <a:rPr lang="zh-CN" altLang="en-US" dirty="0"/>
-              <a:t>是</a:t>
-            </a:r>
-            <a:r>
-              <a:rPr lang="en-US" altLang="zh-CN" dirty="0" smtClean="0"/>
+              <a:t>：“树”的部分是</a:t>
+            </a:r>
+            <a:r>
+              <a:rPr lang="en-US" altLang="zh-CN" dirty="0"/>
               <a:t>《</a:t>
             </a:r>
             <a:r>
-              <a:rPr lang="zh-CN" altLang="en-US" dirty="0" smtClean="0"/>
+              <a:rPr lang="zh-CN" altLang="en-US" dirty="0"/>
               <a:t>算导</a:t>
             </a:r>
             <a:r>
-              <a:rPr lang="en-US" altLang="zh-CN" dirty="0" smtClean="0"/>
+              <a:rPr lang="en-US" altLang="zh-CN" dirty="0"/>
               <a:t>》</a:t>
             </a:r>
             <a:r>
@@ -4134,19 +4069,19 @@
           <a:p>
             <a:pPr lvl="1"/>
             <a:r>
-              <a:rPr lang="en-US" altLang="zh-CN" dirty="0" smtClean="0"/>
+              <a:rPr lang="en-US" altLang="zh-CN" dirty="0"/>
               <a:t>《</a:t>
             </a:r>
             <a:r>
-              <a:rPr lang="zh-CN" altLang="en-US" dirty="0" smtClean="0"/>
+              <a:rPr lang="zh-CN" altLang="en-US" dirty="0"/>
               <a:t>算法设计指南</a:t>
             </a:r>
             <a:r>
-              <a:rPr lang="en-US" altLang="zh-CN" dirty="0" smtClean="0"/>
+              <a:rPr lang="en-US" altLang="zh-CN" dirty="0"/>
               <a:t>》</a:t>
             </a:r>
             <a:r>
-              <a:rPr lang="zh-CN" altLang="en-US" dirty="0" smtClean="0"/>
+              <a:rPr lang="zh-CN" altLang="en-US" dirty="0"/>
               <a:t>：“树”的部分很粗略</a:t>
             </a:r>
             <a:endParaRPr lang="en-US" altLang="zh-CN" dirty="0"/>
@@ -4154,136 +4089,132 @@
           <a:p>
             <a:pPr lvl="1"/>
             <a:r>
-              <a:rPr lang="en-US" altLang="zh-CN" dirty="0" smtClean="0"/>
+              <a:rPr lang="en-US" altLang="zh-CN" dirty="0"/>
               <a:t>《</a:t>
             </a:r>
             <a:r>
-              <a:rPr lang="zh-CN" altLang="en-US" dirty="0" smtClean="0"/>
+              <a:rPr lang="zh-CN" altLang="en-US" dirty="0"/>
               <a:t>算法竞赛入门经典</a:t>
             </a:r>
             <a:r>
-              <a:rPr lang="en-US" altLang="zh-CN" dirty="0" smtClean="0"/>
+              <a:rPr lang="en-US" altLang="zh-CN" dirty="0"/>
               <a:t>》</a:t>
             </a:r>
             <a:r>
-              <a:rPr lang="zh-CN" altLang="en-US" dirty="0" smtClean="0"/>
+              <a:rPr lang="zh-CN" altLang="en-US" dirty="0"/>
               <a:t>：只讲了几道典型题，深度和广度远远不够</a:t>
             </a:r>
-            <a:endParaRPr lang="en-US" altLang="zh-CN" dirty="0" smtClean="0"/>
-          </a:p>
-          <a:p>
-            <a:r>
-              <a:rPr lang="zh-CN" altLang="en-US" dirty="0" smtClean="0"/>
+            <a:endParaRPr lang="en-US" altLang="zh-CN" dirty="0"/>
+          </a:p>
+          <a:p>
+            <a:r>
+              <a:rPr lang="zh-CN" altLang="en-US" dirty="0"/>
               <a:t>题库：以面试和工作为目的，某些知名反人类</a:t>
             </a:r>
             <a:r>
-              <a:rPr lang="en-US" altLang="zh-CN" dirty="0" smtClean="0"/>
+              <a:rPr lang="en-US" altLang="zh-CN" dirty="0"/>
               <a:t>OJ</a:t>
             </a:r>
             <a:r>
-              <a:rPr lang="zh-CN" altLang="en-US" dirty="0" smtClean="0"/>
+              <a:rPr lang="zh-CN" altLang="en-US" dirty="0"/>
               <a:t>就别用了</a:t>
             </a:r>
-            <a:endParaRPr lang="en-US" altLang="zh-CN" dirty="0" smtClean="0"/>
+            <a:endParaRPr lang="en-US" altLang="zh-CN" dirty="0"/>
           </a:p>
           <a:p>
             <a:pPr lvl="1"/>
             <a:r>
-              <a:rPr lang="en-US" altLang="zh-CN" dirty="0" err="1" smtClean="0"/>
+              <a:rPr lang="en-US" altLang="zh-CN" dirty="0" err="1"/>
               <a:t>LeetCode</a:t>
             </a:r>
             <a:r>
-              <a:rPr lang="zh-CN" altLang="en-US" dirty="0" smtClean="0"/>
+              <a:rPr lang="zh-CN" altLang="en-US" dirty="0"/>
               <a:t>：比较全，题解和讨论也很多</a:t>
             </a:r>
-            <a:endParaRPr lang="en-US" altLang="zh-CN" dirty="0" smtClean="0"/>
+            <a:endParaRPr lang="en-US" altLang="zh-CN" dirty="0"/>
           </a:p>
           <a:p>
             <a:pPr lvl="1"/>
             <a:r>
               <a:rPr lang="zh-CN" altLang="en-US" dirty="0"/>
-              <a:t>剑</a:t>
-            </a:r>
-            <a:r>
-              <a:rPr lang="zh-CN" altLang="en-US" dirty="0" smtClean="0"/>
-              <a:t>指</a:t>
-            </a:r>
-            <a:r>
-              <a:rPr lang="en-US" altLang="zh-CN" dirty="0" smtClean="0"/>
+              <a:t>剑指</a:t>
+            </a:r>
+            <a:r>
+              <a:rPr lang="en-US" altLang="zh-CN" dirty="0"/>
               <a:t>Offer</a:t>
             </a:r>
             <a:r>
-              <a:rPr lang="zh-CN" altLang="en-US" dirty="0" smtClean="0"/>
+              <a:rPr lang="zh-CN" altLang="en-US" dirty="0"/>
               <a:t>：面试高频题，大部分都能在</a:t>
             </a:r>
             <a:r>
-              <a:rPr lang="en-US" altLang="zh-CN" dirty="0" err="1" smtClean="0"/>
+              <a:rPr lang="en-US" altLang="zh-CN" dirty="0" err="1"/>
               <a:t>LeetCode</a:t>
             </a:r>
             <a:r>
-              <a:rPr lang="zh-CN" altLang="en-US" dirty="0" smtClean="0"/>
+              <a:rPr lang="zh-CN" altLang="en-US" dirty="0"/>
               <a:t>找到原题</a:t>
             </a:r>
-            <a:endParaRPr lang="en-US" altLang="zh-CN" dirty="0" smtClean="0"/>
-          </a:p>
-          <a:p>
-            <a:r>
-              <a:rPr lang="zh-CN" altLang="en-US" dirty="0" smtClean="0"/>
+            <a:endParaRPr lang="en-US" altLang="zh-CN" dirty="0"/>
+          </a:p>
+          <a:p>
+            <a:r>
+              <a:rPr lang="zh-CN" altLang="en-US" dirty="0"/>
               <a:t>网站：就看第一个就行</a:t>
             </a:r>
-            <a:endParaRPr lang="en-US" altLang="zh-CN" dirty="0" smtClean="0"/>
+            <a:endParaRPr lang="en-US" altLang="zh-CN" dirty="0"/>
           </a:p>
           <a:p>
             <a:pPr lvl="1"/>
             <a:r>
-              <a:rPr lang="en-US" altLang="zh-CN" dirty="0" smtClean="0"/>
+              <a:rPr lang="en-US" altLang="zh-CN" dirty="0"/>
               <a:t>Google</a:t>
             </a:r>
           </a:p>
           <a:p>
             <a:pPr lvl="1"/>
             <a:r>
-              <a:rPr lang="en-US" altLang="zh-CN" dirty="0" err="1" smtClean="0"/>
+              <a:rPr lang="en-US" altLang="zh-CN" dirty="0" err="1"/>
               <a:t>GeeksforGeeks</a:t>
             </a:r>
             <a:r>
-              <a:rPr lang="zh-CN" altLang="en-US" dirty="0" smtClean="0"/>
+              <a:rPr lang="zh-CN" altLang="en-US" dirty="0"/>
               <a:t>，</a:t>
             </a:r>
             <a:r>
-              <a:rPr lang="en-US" altLang="zh-CN" dirty="0" smtClean="0"/>
+              <a:rPr lang="en-US" altLang="zh-CN" dirty="0"/>
               <a:t>Stack Overflow</a:t>
             </a:r>
             <a:r>
-              <a:rPr lang="zh-CN" altLang="en-US" dirty="0" smtClean="0"/>
+              <a:rPr lang="zh-CN" altLang="en-US" dirty="0"/>
               <a:t>，</a:t>
             </a:r>
             <a:r>
-              <a:rPr lang="en-US" altLang="zh-CN" dirty="0" smtClean="0"/>
+              <a:rPr lang="en-US" altLang="zh-CN" dirty="0"/>
               <a:t>Wikipedia</a:t>
             </a:r>
             <a:r>
-              <a:rPr lang="zh-CN" altLang="en-US" dirty="0" smtClean="0"/>
+              <a:rPr lang="zh-CN" altLang="en-US" dirty="0"/>
               <a:t>，</a:t>
             </a:r>
             <a:r>
-              <a:rPr lang="en-US" altLang="zh-CN" dirty="0" err="1" smtClean="0"/>
+              <a:rPr lang="en-US" altLang="zh-CN" dirty="0" err="1"/>
               <a:t>Visualgo</a:t>
             </a:r>
             <a:r>
-              <a:rPr lang="zh-CN" altLang="en-US" dirty="0" smtClean="0"/>
+              <a:rPr lang="zh-CN" altLang="en-US" dirty="0"/>
               <a:t>，</a:t>
             </a:r>
             <a:r>
-              <a:rPr lang="en-US" altLang="zh-CN" dirty="0" err="1" smtClean="0"/>
+              <a:rPr lang="en-US" altLang="zh-CN" dirty="0" err="1"/>
               <a:t>TutorialsPoint</a:t>
             </a:r>
             <a:r>
-              <a:rPr lang="zh-CN" altLang="en-US" dirty="0" smtClean="0"/>
+              <a:rPr lang="zh-CN" altLang="en-US" dirty="0"/>
               <a:t>，</a:t>
             </a:r>
             <a:r>
-              <a:rPr lang="en-US" altLang="zh-CN" dirty="0" smtClean="0"/>
+              <a:rPr lang="en-US" altLang="zh-CN" dirty="0"/>
               <a:t>……</a:t>
             </a:r>
           </a:p>
@@ -4291,13 +4222,9 @@
             <a:pPr lvl="1"/>
             <a:r>
               <a:rPr lang="zh-CN" altLang="en-US" dirty="0"/>
-              <a:t>各种</a:t>
-            </a:r>
-            <a:r>
-              <a:rPr lang="zh-CN" altLang="en-US" dirty="0" smtClean="0"/>
-              <a:t>博客</a:t>
-            </a:r>
-            <a:endParaRPr lang="en-US" altLang="zh-CN" dirty="0" smtClean="0"/>
+              <a:t>各种博客</a:t>
+            </a:r>
+            <a:endParaRPr lang="en-US" altLang="zh-CN" dirty="0"/>
           </a:p>
           <a:p>
             <a:pPr lvl="1"/>
@@ -4305,7 +4232,7 @@
           </a:p>
           <a:p>
             <a:pPr lvl="1"/>
-            <a:endParaRPr lang="en-US" altLang="zh-CN" dirty="0" smtClean="0"/>
+            <a:endParaRPr lang="en-US" altLang="zh-CN" dirty="0"/>
           </a:p>
         </p:txBody>
       </p:sp>
@@ -4343,13 +4270,6 @@
   <p:clrMapOvr>
     <a:masterClrMapping/>
   </p:clrMapOvr>
-  <p:timing>
-    <p:tnLst>
-      <p:par>
-        <p:cTn id="1" dur="indefinite" restart="never" nodeType="tmRoot"/>
-      </p:par>
-    </p:tnLst>
-  </p:timing>
 </p:sld>
 </file>
 
@@ -4386,10 +4306,9 @@
           <a:lstStyle/>
           <a:p>
             <a:r>
-              <a:rPr lang="zh-CN" altLang="en-US" dirty="0" smtClean="0"/>
+              <a:rPr lang="zh-CN" altLang="en-US" dirty="0"/>
               <a:t>学习方法</a:t>
             </a:r>
-            <a:endParaRPr lang="zh-CN" altLang="en-US" dirty="0"/>
           </a:p>
         </p:txBody>
       </p:sp>
@@ -4411,104 +4330,87 @@
           <a:lstStyle/>
           <a:p>
             <a:r>
-              <a:rPr lang="zh-CN" altLang="en-US" dirty="0" smtClean="0"/>
+              <a:rPr lang="zh-CN" altLang="en-US" dirty="0"/>
               <a:t>新手期</a:t>
             </a:r>
-            <a:endParaRPr lang="en-US" altLang="zh-CN" dirty="0" smtClean="0"/>
+            <a:endParaRPr lang="en-US" altLang="zh-CN" dirty="0"/>
           </a:p>
           <a:p>
             <a:pPr lvl="1"/>
             <a:r>
-              <a:rPr lang="zh-CN" altLang="en-US" dirty="0" smtClean="0"/>
+              <a:rPr lang="zh-CN" altLang="en-US" dirty="0"/>
               <a:t>一力降十会：打好基础，巩固知识点，基础不牢，地动山摇</a:t>
             </a:r>
-            <a:endParaRPr lang="en-US" altLang="zh-CN" dirty="0" smtClean="0"/>
+            <a:endParaRPr lang="en-US" altLang="zh-CN" dirty="0"/>
           </a:p>
           <a:p>
             <a:pPr lvl="1"/>
             <a:r>
-              <a:rPr lang="zh-CN" altLang="en-US" dirty="0" smtClean="0"/>
+              <a:rPr lang="zh-CN" altLang="en-US" dirty="0"/>
               <a:t>量变引起质变：多刷题，针对性地刷</a:t>
             </a:r>
-            <a:endParaRPr lang="en-US" altLang="zh-CN" dirty="0" smtClean="0"/>
+            <a:endParaRPr lang="en-US" altLang="zh-CN" dirty="0"/>
           </a:p>
           <a:p>
             <a:pPr lvl="1"/>
             <a:r>
-              <a:rPr lang="zh-CN" altLang="en-US" dirty="0" smtClean="0"/>
+              <a:rPr lang="zh-CN" altLang="en-US" dirty="0"/>
               <a:t>他山之石可以攻玉：多看相关评论、题解、技术文章</a:t>
             </a:r>
-            <a:endParaRPr lang="en-US" altLang="zh-CN" dirty="0" smtClean="0"/>
+            <a:endParaRPr lang="en-US" altLang="zh-CN" dirty="0"/>
           </a:p>
           <a:p>
             <a:pPr lvl="1"/>
             <a:r>
               <a:rPr lang="zh-CN" altLang="en-US" dirty="0"/>
-              <a:t>好</a:t>
-            </a:r>
-            <a:r>
-              <a:rPr lang="zh-CN" altLang="en-US" dirty="0" smtClean="0"/>
-              <a:t>记性不如烂笔头：勤记录勤总结刷题的思路和链接</a:t>
-            </a:r>
-            <a:endParaRPr lang="en-US" altLang="zh-CN" dirty="0" smtClean="0"/>
-          </a:p>
-          <a:p>
-            <a:r>
-              <a:rPr lang="zh-CN" altLang="en-US" dirty="0"/>
-              <a:t>进</a:t>
-            </a:r>
-            <a:r>
-              <a:rPr lang="zh-CN" altLang="en-US" dirty="0" smtClean="0"/>
-              <a:t>阶期：</a:t>
-            </a:r>
-            <a:endParaRPr lang="en-US" altLang="zh-CN" dirty="0" smtClean="0"/>
+              <a:t>好记性不如烂笔头：勤记录勤总结刷题的思路和链接</a:t>
+            </a:r>
+            <a:endParaRPr lang="en-US" altLang="zh-CN" dirty="0"/>
+          </a:p>
+          <a:p>
+            <a:r>
+              <a:rPr lang="zh-CN" altLang="en-US" dirty="0"/>
+              <a:t>进阶期：</a:t>
+            </a:r>
+            <a:endParaRPr lang="en-US" altLang="zh-CN" dirty="0"/>
           </a:p>
           <a:p>
             <a:pPr lvl="1"/>
             <a:r>
-              <a:rPr lang="zh-CN" altLang="en-US" dirty="0" smtClean="0"/>
+              <a:rPr lang="zh-CN" altLang="en-US" dirty="0"/>
               <a:t>温故而知新：重刷已经刷过但是很经典的题</a:t>
             </a:r>
-            <a:endParaRPr lang="en-US" altLang="zh-CN" dirty="0" smtClean="0"/>
+            <a:endParaRPr lang="en-US" altLang="zh-CN" dirty="0"/>
           </a:p>
           <a:p>
             <a:pPr lvl="1"/>
             <a:r>
               <a:rPr lang="zh-CN" altLang="en-US" dirty="0"/>
-              <a:t>赠人玫瑰手有余香：</a:t>
-            </a:r>
-            <a:r>
-              <a:rPr lang="zh-CN" altLang="en-US" dirty="0" smtClean="0"/>
-              <a:t>多分享心得，多写提炼总结</a:t>
-            </a:r>
-            <a:endParaRPr lang="en-US" altLang="zh-CN" dirty="0" smtClean="0"/>
+              <a:t>赠人玫瑰手有余香：多分享心得，多写提炼总结</a:t>
+            </a:r>
+            <a:endParaRPr lang="en-US" altLang="zh-CN" dirty="0"/>
           </a:p>
           <a:p>
             <a:pPr lvl="1"/>
             <a:r>
-              <a:rPr lang="zh-CN" altLang="en-US" dirty="0" smtClean="0"/>
+              <a:rPr lang="zh-CN" altLang="en-US" dirty="0"/>
               <a:t>抓住主要矛盾：不拘泥于各种算法细节</a:t>
             </a:r>
-            <a:endParaRPr lang="en-US" altLang="zh-CN" dirty="0" smtClean="0"/>
-          </a:p>
-          <a:p>
-            <a:r>
-              <a:rPr lang="zh-CN" altLang="en-US" dirty="0"/>
-              <a:t>大</a:t>
-            </a:r>
-            <a:r>
-              <a:rPr lang="zh-CN" altLang="en-US" dirty="0" smtClean="0"/>
-              <a:t>佬期：</a:t>
-            </a:r>
-            <a:endParaRPr lang="en-US" altLang="zh-CN" dirty="0" smtClean="0"/>
+            <a:endParaRPr lang="en-US" altLang="zh-CN" dirty="0"/>
+          </a:p>
+          <a:p>
+            <a:r>
+              <a:rPr lang="zh-CN" altLang="en-US" dirty="0"/>
+              <a:t>大佬期：</a:t>
+            </a:r>
+            <a:endParaRPr lang="en-US" altLang="zh-CN" dirty="0"/>
           </a:p>
           <a:p>
             <a:pPr lvl="1"/>
             <a:r>
-              <a:rPr lang="zh-CN" altLang="en-US" dirty="0" smtClean="0"/>
+              <a:rPr lang="zh-CN" altLang="en-US" dirty="0"/>
               <a:t>对不起我还没到这一步不知道大佬是怎么做的</a:t>
             </a:r>
-            <a:endParaRPr lang="zh-CN" altLang="en-US" dirty="0"/>
           </a:p>
         </p:txBody>
       </p:sp>
@@ -4546,13 +4448,6 @@
   <p:clrMapOvr>
     <a:masterClrMapping/>
   </p:clrMapOvr>
-  <p:timing>
-    <p:tnLst>
-      <p:par>
-        <p:cTn id="1" dur="indefinite" restart="never" nodeType="tmRoot"/>
-      </p:par>
-    </p:tnLst>
-  </p:timing>
 </p:sld>
 </file>
 
@@ -4589,10 +4484,9 @@
           <a:lstStyle/>
           <a:p>
             <a:r>
-              <a:rPr lang="zh-CN" altLang="en-US" dirty="0" smtClean="0"/>
+              <a:rPr lang="zh-CN" altLang="en-US" dirty="0"/>
               <a:t>树的知识点</a:t>
             </a:r>
-            <a:endParaRPr lang="zh-CN" altLang="en-US" dirty="0"/>
           </a:p>
         </p:txBody>
       </p:sp>
@@ -4612,59 +4506,51 @@
           <a:lstStyle/>
           <a:p>
             <a:r>
-              <a:rPr lang="zh-CN" altLang="en-US" dirty="0" smtClean="0"/>
+              <a:rPr lang="zh-CN" altLang="en-US" dirty="0"/>
               <a:t>查：绝大多数题型都属于这种</a:t>
             </a:r>
-            <a:endParaRPr lang="en-US" altLang="zh-CN" dirty="0" smtClean="0"/>
+            <a:endParaRPr lang="en-US" altLang="zh-CN" dirty="0"/>
           </a:p>
           <a:p>
             <a:pPr lvl="1"/>
             <a:r>
-              <a:rPr lang="zh-CN" altLang="en-US" dirty="0" smtClean="0"/>
+              <a:rPr lang="zh-CN" altLang="en-US" dirty="0"/>
               <a:t>递归和迭代</a:t>
             </a:r>
-            <a:endParaRPr lang="en-US" altLang="zh-CN" dirty="0" smtClean="0"/>
+            <a:endParaRPr lang="en-US" altLang="zh-CN" dirty="0"/>
           </a:p>
           <a:p>
             <a:pPr lvl="1"/>
             <a:r>
-              <a:rPr lang="zh-CN" altLang="en-US" dirty="0" smtClean="0"/>
+              <a:rPr lang="zh-CN" altLang="en-US" dirty="0"/>
               <a:t>深搜（</a:t>
             </a:r>
             <a:r>
               <a:rPr lang="en-US" altLang="zh-CN" dirty="0"/>
-              <a:t>D</a:t>
-            </a:r>
-            <a:r>
-              <a:rPr lang="en-US" altLang="zh-CN" dirty="0" smtClean="0"/>
-              <a:t>FS</a:t>
-            </a:r>
-            <a:r>
-              <a:rPr lang="zh-CN" altLang="en-US" dirty="0" smtClean="0"/>
+              <a:t>DFS</a:t>
+            </a:r>
+            <a:r>
+              <a:rPr lang="zh-CN" altLang="en-US" dirty="0"/>
               <a:t>）和广搜（</a:t>
             </a:r>
             <a:r>
-              <a:rPr lang="en-US" altLang="zh-CN" dirty="0" smtClean="0"/>
+              <a:rPr lang="en-US" altLang="zh-CN" dirty="0"/>
               <a:t>BFS</a:t>
             </a:r>
             <a:r>
-              <a:rPr lang="zh-CN" altLang="en-US" dirty="0" smtClean="0"/>
+              <a:rPr lang="zh-CN" altLang="en-US" dirty="0"/>
               <a:t>）</a:t>
             </a:r>
-            <a:endParaRPr lang="en-US" altLang="zh-CN" dirty="0" smtClean="0"/>
+            <a:endParaRPr lang="en-US" altLang="zh-CN" dirty="0"/>
           </a:p>
           <a:p>
             <a:pPr lvl="2"/>
             <a:r>
               <a:rPr lang="zh-CN" altLang="en-US" dirty="0"/>
-              <a:t>深</a:t>
-            </a:r>
-            <a:r>
-              <a:rPr lang="zh-CN" altLang="en-US" dirty="0" smtClean="0"/>
-              <a:t>搜：前序、中序、后序遍历，通常用</a:t>
-            </a:r>
-            <a:r>
-              <a:rPr lang="zh-CN" altLang="en-US" dirty="0" smtClean="0">
+              <a:t>深搜：前序、中序、后序遍历，通常用</a:t>
+            </a:r>
+            <a:r>
+              <a:rPr lang="zh-CN" altLang="en-US" dirty="0">
                 <a:solidFill>
                   <a:srgbClr val="00B0F0"/>
                 </a:solidFill>
@@ -4672,23 +4558,19 @@
               <a:t>递归</a:t>
             </a:r>
             <a:r>
-              <a:rPr lang="zh-CN" altLang="en-US" dirty="0" smtClean="0"/>
+              <a:rPr lang="zh-CN" altLang="en-US" dirty="0"/>
               <a:t>写起来更方便</a:t>
             </a:r>
-            <a:endParaRPr lang="en-US" altLang="zh-CN" dirty="0" smtClean="0"/>
+            <a:endParaRPr lang="en-US" altLang="zh-CN" dirty="0"/>
           </a:p>
           <a:p>
             <a:pPr lvl="2"/>
             <a:r>
               <a:rPr lang="zh-CN" altLang="en-US" dirty="0"/>
-              <a:t>广</a:t>
-            </a:r>
-            <a:r>
-              <a:rPr lang="zh-CN" altLang="en-US" dirty="0" smtClean="0"/>
-              <a:t>搜：层次遍历，通常用</a:t>
-            </a:r>
-            <a:r>
-              <a:rPr lang="zh-CN" altLang="en-US" dirty="0" smtClean="0">
+              <a:t>广搜：层次遍历，通常用</a:t>
+            </a:r>
+            <a:r>
+              <a:rPr lang="zh-CN" altLang="en-US" dirty="0">
                 <a:solidFill>
                   <a:srgbClr val="00B0F0"/>
                 </a:solidFill>
@@ -4696,53 +4578,40 @@
               <a:t>迭代</a:t>
             </a:r>
             <a:r>
-              <a:rPr lang="zh-CN" altLang="en-US" dirty="0" smtClean="0"/>
+              <a:rPr lang="zh-CN" altLang="en-US" dirty="0"/>
               <a:t>写起来更方便</a:t>
             </a:r>
-            <a:endParaRPr lang="en-US" altLang="zh-CN" dirty="0" smtClean="0"/>
+            <a:endParaRPr lang="en-US" altLang="zh-CN" dirty="0"/>
           </a:p>
           <a:p>
             <a:pPr lvl="2"/>
             <a:r>
               <a:rPr lang="zh-CN" altLang="en-US" dirty="0"/>
-              <a:t>深</a:t>
-            </a:r>
-            <a:r>
-              <a:rPr lang="zh-CN" altLang="en-US" dirty="0" smtClean="0"/>
-              <a:t>搜的出现和使用频率要高于广搜</a:t>
-            </a:r>
-            <a:endParaRPr lang="en-US" altLang="zh-CN" dirty="0" smtClean="0"/>
-          </a:p>
-          <a:p>
-            <a:r>
-              <a:rPr lang="zh-CN" altLang="en-US" dirty="0" smtClean="0"/>
+              <a:t>深搜的出现和使用频率要高于广搜</a:t>
+            </a:r>
+            <a:endParaRPr lang="en-US" altLang="zh-CN" dirty="0"/>
+          </a:p>
+          <a:p>
+            <a:r>
+              <a:rPr lang="zh-CN" altLang="en-US" dirty="0"/>
               <a:t>增删改：涉及树的实现和底层原理，教科书上着墨很多</a:t>
             </a:r>
-            <a:endParaRPr lang="en-US" altLang="zh-CN" dirty="0" smtClean="0"/>
+            <a:endParaRPr lang="en-US" altLang="zh-CN" dirty="0"/>
           </a:p>
           <a:p>
             <a:pPr lvl="1"/>
             <a:r>
-              <a:rPr lang="zh-CN" altLang="en-US" dirty="0" smtClean="0"/>
-              <a:t>构建</a:t>
-            </a:r>
-            <a:r>
-              <a:rPr lang="zh-CN" altLang="en-US" dirty="0"/>
-              <a:t>、序列化、合并、翻转、修剪、</a:t>
-            </a:r>
-            <a:r>
-              <a:rPr lang="zh-CN" altLang="en-US" dirty="0" smtClean="0"/>
-              <a:t>平衡</a:t>
-            </a:r>
-            <a:endParaRPr lang="en-US" altLang="zh-CN" dirty="0" smtClean="0"/>
+              <a:rPr lang="zh-CN" altLang="en-US" dirty="0"/>
+              <a:t>构建、序列化、合并、翻转、修剪、平衡</a:t>
+            </a:r>
+            <a:endParaRPr lang="en-US" altLang="zh-CN" dirty="0"/>
           </a:p>
           <a:p>
             <a:pPr lvl="2"/>
             <a:r>
-              <a:rPr lang="zh-CN" altLang="en-US" dirty="0" smtClean="0"/>
+              <a:rPr lang="zh-CN" altLang="en-US" dirty="0"/>
               <a:t>重点是平衡树</a:t>
             </a:r>
-            <a:endParaRPr lang="zh-CN" altLang="en-US" dirty="0"/>
           </a:p>
         </p:txBody>
       </p:sp>
@@ -4780,13 +4649,6 @@
   <p:clrMapOvr>
     <a:masterClrMapping/>
   </p:clrMapOvr>
-  <p:timing>
-    <p:tnLst>
-      <p:par>
-        <p:cTn id="1" dur="indefinite" restart="never" nodeType="tmRoot"/>
-      </p:par>
-    </p:tnLst>
-  </p:timing>
 </p:sld>
 </file>
 
@@ -4853,10 +4715,9 @@
           <a:lstStyle/>
           <a:p>
             <a:r>
-              <a:rPr lang="zh-CN" altLang="en-US" dirty="0" smtClean="0"/>
+              <a:rPr lang="zh-CN" altLang="en-US" dirty="0"/>
               <a:t>树的常用术语</a:t>
             </a:r>
-            <a:endParaRPr lang="zh-CN" altLang="en-US" dirty="0"/>
           </a:p>
         </p:txBody>
       </p:sp>
@@ -4883,61 +4744,32 @@
           <a:lstStyle/>
           <a:p>
             <a:r>
-              <a:rPr lang="en-US" altLang="zh-CN" sz="2000" dirty="0" smtClean="0"/>
+              <a:rPr lang="en-US" altLang="zh-CN" sz="2000" dirty="0"/>
               <a:t>Node, Root, Child, Leaf, Internal node, </a:t>
             </a:r>
           </a:p>
           <a:p>
             <a:r>
               <a:rPr lang="en-US" altLang="zh-CN" sz="2000" dirty="0"/>
-              <a:t>Sub Tree, </a:t>
-            </a:r>
-            <a:r>
-              <a:rPr lang="en-US" altLang="zh-CN" sz="2000" dirty="0" smtClean="0"/>
-              <a:t>Edge</a:t>
-            </a:r>
+              <a:t>Sub Tree, Edge, Path</a:t>
+            </a:r>
+          </a:p>
+          <a:p>
             <a:r>
               <a:rPr lang="en-US" altLang="zh-CN" sz="2000" dirty="0"/>
-              <a:t>, </a:t>
-            </a:r>
-            <a:r>
-              <a:rPr lang="en-US" altLang="zh-CN" sz="2000" dirty="0" smtClean="0"/>
-              <a:t>Path</a:t>
-            </a:r>
-            <a:endParaRPr lang="en-US" altLang="zh-CN" sz="2000" dirty="0"/>
-          </a:p>
-          <a:p>
-            <a:r>
-              <a:rPr lang="en-US" altLang="zh-CN" sz="2000" dirty="0" smtClean="0"/>
               <a:t>Depth, Level, Height, Breadth, Key(Value)</a:t>
             </a:r>
           </a:p>
           <a:p>
             <a:r>
-              <a:rPr lang="en-US" altLang="zh-CN" sz="2000" dirty="0" smtClean="0"/>
-              <a:t>Binary Tree, Binary </a:t>
-            </a:r>
-            <a:r>
               <a:rPr lang="en-US" altLang="zh-CN" sz="2000" dirty="0"/>
-              <a:t>Search </a:t>
-            </a:r>
-            <a:r>
-              <a:rPr lang="en-US" altLang="zh-CN" sz="2000" dirty="0" smtClean="0"/>
-              <a:t>Tree</a:t>
-            </a:r>
-          </a:p>
-          <a:p>
-            <a:r>
-              <a:rPr lang="en-US" altLang="zh-CN" sz="2000" dirty="0" smtClean="0"/>
-              <a:t>Visit</a:t>
-            </a:r>
+              <a:t>Binary Tree, Binary Search Tree</a:t>
+            </a:r>
+          </a:p>
+          <a:p>
             <a:r>
               <a:rPr lang="en-US" altLang="zh-CN" sz="2000" dirty="0"/>
-              <a:t>, </a:t>
-            </a:r>
-            <a:r>
-              <a:rPr lang="en-US" altLang="zh-CN" sz="2000" dirty="0" smtClean="0"/>
-              <a:t>Traversal, Insert, Search, Remove</a:t>
+              <a:t>Visit, Traversal, Insert, Search, Remove</a:t>
             </a:r>
           </a:p>
         </p:txBody>
@@ -4976,13 +4808,6 @@
   <p:clrMapOvr>
     <a:masterClrMapping/>
   </p:clrMapOvr>
-  <p:timing>
-    <p:tnLst>
-      <p:par>
-        <p:cTn id="1" dur="indefinite" restart="never" nodeType="tmRoot"/>
-      </p:par>
-    </p:tnLst>
-  </p:timing>
 </p:sld>
 </file>
 
@@ -5019,18 +4844,17 @@
           <a:lstStyle/>
           <a:p>
             <a:r>
-              <a:rPr lang="zh-CN" altLang="en-US" dirty="0" smtClean="0"/>
+              <a:rPr lang="zh-CN" altLang="en-US" dirty="0"/>
               <a:t>递归 </a:t>
             </a:r>
             <a:r>
-              <a:rPr lang="en-US" altLang="zh-CN" dirty="0" smtClean="0"/>
+              <a:rPr lang="en-US" altLang="zh-CN" dirty="0"/>
               <a:t>vs </a:t>
             </a:r>
             <a:r>
-              <a:rPr lang="zh-CN" altLang="en-US" dirty="0" smtClean="0"/>
+              <a:rPr lang="zh-CN" altLang="en-US" dirty="0"/>
               <a:t>迭代</a:t>
             </a:r>
-            <a:endParaRPr lang="zh-CN" altLang="en-US" dirty="0"/>
           </a:p>
         </p:txBody>
       </p:sp>
@@ -5081,11 +4905,11 @@
           <a:lstStyle/>
           <a:p>
             <a:r>
-              <a:rPr lang="zh-CN" altLang="en-US" dirty="0" smtClean="0"/>
+              <a:rPr lang="zh-CN" altLang="en-US" dirty="0"/>
               <a:t>运行效率：</a:t>
             </a:r>
             <a:r>
-              <a:rPr lang="zh-CN" altLang="en-US" dirty="0" smtClean="0">
+              <a:rPr lang="zh-CN" altLang="en-US" dirty="0">
                 <a:solidFill>
                   <a:srgbClr val="00B0F0"/>
                 </a:solidFill>
@@ -5093,34 +4917,34 @@
               <a:t>迭代</a:t>
             </a:r>
             <a:r>
-              <a:rPr lang="zh-CN" altLang="en-US" dirty="0" smtClean="0"/>
+              <a:rPr lang="zh-CN" altLang="en-US" dirty="0"/>
               <a:t>优于递归</a:t>
             </a:r>
-            <a:endParaRPr lang="en-US" altLang="zh-CN" dirty="0" smtClean="0"/>
+            <a:endParaRPr lang="en-US" altLang="zh-CN" dirty="0"/>
           </a:p>
           <a:p>
             <a:pPr lvl="1"/>
             <a:r>
-              <a:rPr lang="zh-CN" altLang="en-US" dirty="0" smtClean="0"/>
+              <a:rPr lang="zh-CN" altLang="en-US" dirty="0"/>
               <a:t>递归需要多次调用函数并管理调用栈，时间和空间开销都比较大，还可能爆栈</a:t>
             </a:r>
-            <a:endParaRPr lang="en-US" altLang="zh-CN" dirty="0" smtClean="0"/>
+            <a:endParaRPr lang="en-US" altLang="zh-CN" dirty="0"/>
           </a:p>
           <a:p>
             <a:pPr lvl="1"/>
             <a:r>
-              <a:rPr lang="zh-CN" altLang="en-US" dirty="0" smtClean="0"/>
+              <a:rPr lang="zh-CN" altLang="en-US" dirty="0"/>
               <a:t>迭代通常由编写者手动实现，通常更快</a:t>
             </a:r>
-            <a:endParaRPr lang="en-US" altLang="zh-CN" dirty="0" smtClean="0"/>
-          </a:p>
-          <a:p>
-            <a:r>
-              <a:rPr lang="zh-CN" altLang="en-US" dirty="0" smtClean="0"/>
+            <a:endParaRPr lang="en-US" altLang="zh-CN" dirty="0"/>
+          </a:p>
+          <a:p>
+            <a:r>
+              <a:rPr lang="zh-CN" altLang="en-US" dirty="0"/>
               <a:t>实现难度：</a:t>
             </a:r>
             <a:r>
-              <a:rPr lang="zh-CN" altLang="en-US" dirty="0" smtClean="0">
+              <a:rPr lang="zh-CN" altLang="en-US" dirty="0">
                 <a:solidFill>
                   <a:srgbClr val="00B0F0"/>
                 </a:solidFill>
@@ -5128,73 +4952,72 @@
               <a:t>递归</a:t>
             </a:r>
             <a:r>
-              <a:rPr lang="zh-CN" altLang="en-US" dirty="0" smtClean="0"/>
+              <a:rPr lang="zh-CN" altLang="en-US" dirty="0"/>
               <a:t>优于迭代</a:t>
             </a:r>
-            <a:endParaRPr lang="en-US" altLang="zh-CN" dirty="0" smtClean="0"/>
+            <a:endParaRPr lang="en-US" altLang="zh-CN" dirty="0"/>
           </a:p>
           <a:p>
             <a:pPr lvl="1"/>
             <a:r>
-              <a:rPr lang="zh-CN" altLang="en-US" dirty="0" smtClean="0"/>
+              <a:rPr lang="zh-CN" altLang="en-US" dirty="0"/>
               <a:t>只要理清逻辑，递归通常比迭代简洁很多</a:t>
             </a:r>
-            <a:endParaRPr lang="en-US" altLang="zh-CN" dirty="0" smtClean="0"/>
+            <a:endParaRPr lang="en-US" altLang="zh-CN" dirty="0"/>
           </a:p>
           <a:p>
             <a:pPr lvl="1"/>
             <a:r>
-              <a:rPr lang="zh-CN" altLang="en-US" dirty="0" smtClean="0"/>
+              <a:rPr lang="zh-CN" altLang="en-US" dirty="0"/>
               <a:t>迭代需要自己维护栈和中间变量，并且有许多判断条件和边界情况</a:t>
             </a:r>
-            <a:endParaRPr lang="en-US" altLang="zh-CN" dirty="0" smtClean="0"/>
-          </a:p>
-          <a:p>
-            <a:r>
-              <a:rPr lang="zh-CN" altLang="en-US" dirty="0" smtClean="0"/>
+            <a:endParaRPr lang="en-US" altLang="zh-CN" dirty="0"/>
+          </a:p>
+          <a:p>
+            <a:r>
+              <a:rPr lang="zh-CN" altLang="en-US" dirty="0"/>
               <a:t>实用情况：</a:t>
             </a:r>
-            <a:endParaRPr lang="en-US" altLang="zh-CN" dirty="0" smtClean="0"/>
+            <a:endParaRPr lang="en-US" altLang="zh-CN" dirty="0"/>
           </a:p>
           <a:p>
             <a:pPr lvl="1"/>
             <a:r>
-              <a:rPr lang="zh-CN" altLang="en-US" dirty="0" smtClean="0"/>
+              <a:rPr lang="zh-CN" altLang="en-US" dirty="0"/>
               <a:t>在测试数据量级较小时，刷题推荐递归，能秒</a:t>
             </a:r>
             <a:r>
-              <a:rPr lang="en-US" altLang="zh-CN" dirty="0" smtClean="0"/>
+              <a:rPr lang="en-US" altLang="zh-CN" dirty="0"/>
               <a:t>70%</a:t>
             </a:r>
             <a:r>
-              <a:rPr lang="zh-CN" altLang="en-US" dirty="0" smtClean="0"/>
+              <a:rPr lang="zh-CN" altLang="en-US" dirty="0"/>
               <a:t>的题</a:t>
             </a:r>
-            <a:endParaRPr lang="en-US" altLang="zh-CN" dirty="0" smtClean="0"/>
+            <a:endParaRPr lang="en-US" altLang="zh-CN" dirty="0"/>
           </a:p>
           <a:p>
             <a:pPr lvl="1"/>
             <a:r>
-              <a:rPr lang="zh-CN" altLang="en-US" dirty="0" smtClean="0"/>
+              <a:rPr lang="zh-CN" altLang="en-US" dirty="0"/>
               <a:t>面试时更喜欢在递归基础上加问迭代实现</a:t>
             </a:r>
-            <a:endParaRPr lang="en-US" altLang="zh-CN" dirty="0" smtClean="0"/>
+            <a:endParaRPr lang="en-US" altLang="zh-CN" dirty="0"/>
           </a:p>
           <a:p>
             <a:pPr lvl="2"/>
             <a:r>
-              <a:rPr lang="zh-CN" altLang="en-US" strike="sngStrike" dirty="0" smtClean="0"/>
+              <a:rPr lang="zh-CN" altLang="en-US" strike="sngStrike" dirty="0"/>
               <a:t>因为递归太简单了，区分不出应试者的水平</a:t>
             </a:r>
-            <a:endParaRPr lang="en-US" altLang="zh-CN" strike="sngStrike" dirty="0" smtClean="0"/>
+            <a:endParaRPr lang="en-US" altLang="zh-CN" strike="sngStrike" dirty="0"/>
           </a:p>
           <a:p>
             <a:pPr lvl="2"/>
             <a:r>
-              <a:rPr lang="zh-CN" altLang="en-US" dirty="0" smtClean="0"/>
+              <a:rPr lang="zh-CN" altLang="en-US" dirty="0"/>
               <a:t>可以考察应试者的数据结构基础和逻辑思维能力</a:t>
             </a:r>
-            <a:endParaRPr lang="zh-CN" altLang="en-US" dirty="0"/>
           </a:p>
         </p:txBody>
       </p:sp>
@@ -5208,13 +5031,6 @@
   <p:clrMapOvr>
     <a:masterClrMapping/>
   </p:clrMapOvr>
-  <p:timing>
-    <p:tnLst>
-      <p:par>
-        <p:cTn id="1" dur="indefinite" restart="never" nodeType="tmRoot"/>
-      </p:par>
-    </p:tnLst>
-  </p:timing>
 </p:sld>
 </file>
 
@@ -5251,10 +5067,9 @@
           <a:lstStyle/>
           <a:p>
             <a:r>
-              <a:rPr lang="zh-CN" altLang="en-US" dirty="0" smtClean="0"/>
+              <a:rPr lang="zh-CN" altLang="en-US" dirty="0"/>
               <a:t>树的遍历</a:t>
             </a:r>
-            <a:endParaRPr lang="zh-CN" altLang="en-US" dirty="0"/>
           </a:p>
         </p:txBody>
       </p:sp>
@@ -5280,81 +5095,61 @@
           <a:p>
             <a:r>
               <a:rPr lang="zh-CN" altLang="en-US" dirty="0"/>
-              <a:t>前</a:t>
-            </a:r>
-            <a:r>
-              <a:rPr lang="zh-CN" altLang="en-US" dirty="0" smtClean="0"/>
-              <a:t>序（先序）、中序、后序</a:t>
-            </a:r>
-            <a:endParaRPr lang="en-US" altLang="zh-CN" dirty="0" smtClean="0"/>
+              <a:t>前序（先序）、中序、后序</a:t>
+            </a:r>
+            <a:endParaRPr lang="en-US" altLang="zh-CN" dirty="0"/>
           </a:p>
           <a:p>
             <a:pPr lvl="1"/>
             <a:r>
-              <a:rPr lang="zh-CN" altLang="en-US" dirty="0" smtClean="0"/>
-              <a:t>这里的次序指的是根</a:t>
-            </a:r>
-            <a:r>
-              <a:rPr lang="zh-CN" altLang="en-US" dirty="0"/>
-              <a:t>结点的遍历顺序，最先遍历根结点就叫前序或先序，最后遍历根结点就叫</a:t>
-            </a:r>
-            <a:r>
-              <a:rPr lang="zh-CN" altLang="en-US" dirty="0" smtClean="0"/>
-              <a:t>后序</a:t>
-            </a:r>
-            <a:endParaRPr lang="en-US" altLang="zh-CN" dirty="0" smtClean="0"/>
+              <a:rPr lang="zh-CN" altLang="en-US" dirty="0"/>
+              <a:t>这里的次序指的是根结点的遍历顺序，最先遍历根结点就叫前序或先序，最后遍历根结点就叫后序</a:t>
+            </a:r>
+            <a:endParaRPr lang="en-US" altLang="zh-CN" dirty="0"/>
           </a:p>
           <a:p>
             <a:pPr lvl="1"/>
             <a:r>
-              <a:rPr lang="zh-CN" altLang="en-US" dirty="0" smtClean="0"/>
-              <a:t>左</a:t>
-            </a:r>
-            <a:r>
-              <a:rPr lang="zh-CN" altLang="en-US" dirty="0"/>
-              <a:t>子树永远在右子树之前</a:t>
-            </a:r>
-            <a:r>
-              <a:rPr lang="zh-CN" altLang="en-US" dirty="0" smtClean="0"/>
-              <a:t>遍历</a:t>
-            </a:r>
-            <a:endParaRPr lang="en-US" altLang="zh-CN" dirty="0" smtClean="0"/>
-          </a:p>
-          <a:p>
-            <a:r>
-              <a:rPr lang="zh-CN" altLang="en-US" dirty="0" smtClean="0"/>
+              <a:rPr lang="zh-CN" altLang="en-US" dirty="0"/>
+              <a:t>左子树永远在右子树之前遍历</a:t>
+            </a:r>
+            <a:endParaRPr lang="en-US" altLang="zh-CN" dirty="0"/>
+          </a:p>
+          <a:p>
+            <a:r>
+              <a:rPr lang="zh-CN" altLang="en-US" dirty="0"/>
               <a:t>层次遍历</a:t>
             </a:r>
-            <a:endParaRPr lang="en-US" altLang="zh-CN" dirty="0" smtClean="0"/>
+            <a:endParaRPr lang="en-US" altLang="zh-CN" dirty="0"/>
           </a:p>
           <a:p>
             <a:pPr lvl="1"/>
             <a:r>
-              <a:rPr lang="en-US" altLang="zh-CN" dirty="0" err="1" smtClean="0"/>
+              <a:rPr lang="en-US" altLang="zh-CN" dirty="0" err="1"/>
               <a:t>LeetCode</a:t>
             </a:r>
             <a:r>
-              <a:rPr lang="en-US" altLang="zh-CN" dirty="0" smtClean="0"/>
+              <a:rPr lang="en-US" altLang="zh-CN" dirty="0"/>
               <a:t> </a:t>
             </a:r>
             <a:r>
-              <a:rPr lang="zh-CN" altLang="en-US" dirty="0" smtClean="0"/>
+              <a:rPr lang="zh-CN" altLang="en-US" dirty="0"/>
               <a:t>中树的测试数据的</a:t>
             </a:r>
             <a:r>
-              <a:rPr lang="zh-CN" altLang="en-US" dirty="0" smtClean="0">
+              <a:rPr lang="zh-CN" altLang="en-US" dirty="0">
                 <a:hlinkClick r:id="rId2"/>
               </a:rPr>
               <a:t>表示方法</a:t>
             </a:r>
-            <a:endParaRPr lang="en-US" altLang="zh-CN" dirty="0" smtClean="0"/>
-          </a:p>
-          <a:p>
-            <a:r>
-              <a:rPr lang="zh-CN" altLang="en-US" dirty="0" smtClean="0"/>
+            <a:endParaRPr lang="en-US" altLang="zh-CN" dirty="0"/>
+          </a:p>
+          <a:p>
+            <a:r>
+              <a:rPr lang="zh-CN" altLang="en-US" dirty="0"/>
               <a:t>例题</a:t>
             </a:r>
-            <a:endParaRPr lang="en-US" altLang="zh-CN" dirty="0" smtClean="0"/>
+            <a:endParaRPr lang="en-US" altLang="zh-CN" dirty="0"/>
           </a:p>
           <a:p>
             <a:pPr lvl="1"/>
@@ -5439,13 +5234,6 @@
   <p:clrMapOvr>
     <a:masterClrMapping/>
   </p:clrMapOvr>
-  <p:timing>
-    <p:tnLst>
-      <p:par>
-        <p:cTn id="1" dur="indefinite" restart="never" nodeType="tmRoot"/>
-      </p:par>
-    </p:tnLst>
-  </p:timing>
 </p:sld>
 </file>
 
@@ -5482,10 +5270,9 @@
           <a:lstStyle/>
           <a:p>
             <a:r>
-              <a:rPr lang="zh-CN" altLang="en-US" dirty="0" smtClean="0"/>
+              <a:rPr lang="zh-CN" altLang="en-US" dirty="0"/>
               <a:t>中序遍历</a:t>
             </a:r>
-            <a:endParaRPr lang="zh-CN" altLang="en-US" dirty="0"/>
           </a:p>
         </p:txBody>
       </p:sp>
@@ -5505,37 +5292,32 @@
           <a:lstStyle/>
           <a:p>
             <a:r>
-              <a:rPr lang="zh-CN" altLang="en-US" dirty="0" smtClean="0"/>
+              <a:rPr lang="zh-CN" altLang="en-US" dirty="0"/>
               <a:t>递归</a:t>
             </a:r>
-            <a:endParaRPr lang="en-US" altLang="zh-CN" dirty="0" smtClean="0"/>
-          </a:p>
-          <a:p>
-            <a:r>
-              <a:rPr lang="zh-CN" altLang="en-US" dirty="0" smtClean="0"/>
+            <a:endParaRPr lang="en-US" altLang="zh-CN" dirty="0"/>
+          </a:p>
+          <a:p>
+            <a:r>
+              <a:rPr lang="zh-CN" altLang="en-US" dirty="0"/>
               <a:t>迭代</a:t>
             </a:r>
-            <a:endParaRPr lang="en-US" altLang="zh-CN" dirty="0" smtClean="0"/>
+            <a:endParaRPr lang="en-US" altLang="zh-CN" dirty="0"/>
           </a:p>
           <a:p>
             <a:pPr lvl="1"/>
             <a:r>
-              <a:rPr lang="zh-CN" altLang="en-US" dirty="0" smtClean="0"/>
+              <a:rPr lang="zh-CN" altLang="en-US" dirty="0"/>
               <a:t>栈</a:t>
             </a:r>
-            <a:endParaRPr lang="en-US" altLang="zh-CN" dirty="0" smtClean="0"/>
+            <a:endParaRPr lang="en-US" altLang="zh-CN" dirty="0"/>
           </a:p>
           <a:p>
             <a:pPr lvl="1"/>
             <a:r>
               <a:rPr lang="zh-CN" altLang="en-US" dirty="0"/>
-              <a:t>莫里</a:t>
-            </a:r>
-            <a:r>
-              <a:rPr lang="zh-CN" altLang="en-US" dirty="0" smtClean="0"/>
-              <a:t>斯遍历</a:t>
-            </a:r>
-            <a:endParaRPr lang="zh-CN" altLang="en-US" dirty="0"/>
+              <a:t>莫里斯遍历</a:t>
+            </a:r>
           </a:p>
         </p:txBody>
       </p:sp>
@@ -5573,13 +5355,6 @@
   <p:clrMapOvr>
     <a:masterClrMapping/>
   </p:clrMapOvr>
-  <p:timing>
-    <p:tnLst>
-      <p:par>
-        <p:cTn id="1" dur="indefinite" restart="never" nodeType="tmRoot"/>
-      </p:par>
-    </p:tnLst>
-  </p:timing>
 </p:sld>
 </file>
 
@@ -5616,10 +5391,9 @@
           <a:lstStyle/>
           <a:p>
             <a:r>
-              <a:rPr lang="zh-CN" altLang="en-US" dirty="0" smtClean="0"/>
+              <a:rPr lang="zh-CN" altLang="en-US" dirty="0"/>
               <a:t>树</a:t>
             </a:r>
-            <a:endParaRPr lang="zh-CN" altLang="en-US" dirty="0"/>
           </a:p>
         </p:txBody>
       </p:sp>
@@ -5690,7 +5464,7 @@
           <a:p>
             <a:pPr algn="ctr"/>
             <a:r>
-              <a:rPr lang="en-US" altLang="zh-CN" sz="2000" b="1" dirty="0" smtClean="0">
+              <a:rPr lang="en-US" altLang="zh-CN" sz="2000" b="1" dirty="0">
                 <a:solidFill>
                   <a:schemeClr val="tx1"/>
                 </a:solidFill>
@@ -5752,7 +5526,7 @@
           <a:p>
             <a:pPr algn="ctr"/>
             <a:r>
-              <a:rPr lang="en-US" altLang="zh-CN" b="1" dirty="0" smtClean="0">
+              <a:rPr lang="en-US" altLang="zh-CN" b="1" dirty="0">
                 <a:solidFill>
                   <a:schemeClr val="tx1"/>
                 </a:solidFill>
@@ -5814,7 +5588,7 @@
           <a:p>
             <a:pPr algn="ctr"/>
             <a:r>
-              <a:rPr lang="en-US" altLang="zh-CN" b="1" dirty="0" smtClean="0">
+              <a:rPr lang="en-US" altLang="zh-CN" b="1" dirty="0">
                 <a:solidFill>
                   <a:schemeClr val="tx1"/>
                 </a:solidFill>
@@ -5876,7 +5650,7 @@
           <a:p>
             <a:pPr algn="ctr"/>
             <a:r>
-              <a:rPr lang="en-US" altLang="zh-CN" b="1" dirty="0" smtClean="0">
+              <a:rPr lang="en-US" altLang="zh-CN" b="1" dirty="0">
                 <a:solidFill>
                   <a:schemeClr val="tx1"/>
                 </a:solidFill>
@@ -5938,7 +5712,7 @@
           <a:p>
             <a:pPr algn="ctr"/>
             <a:r>
-              <a:rPr lang="en-US" altLang="zh-CN" b="1" dirty="0" smtClean="0">
+              <a:rPr lang="en-US" altLang="zh-CN" b="1" dirty="0">
                 <a:solidFill>
                   <a:schemeClr val="tx1"/>
                 </a:solidFill>
@@ -6156,7 +5930,7 @@
           <a:p>
             <a:pPr algn="ctr"/>
             <a:r>
-              <a:rPr lang="en-US" altLang="zh-CN" b="1" dirty="0" smtClean="0">
+              <a:rPr lang="en-US" altLang="zh-CN" b="1" dirty="0">
                 <a:solidFill>
                   <a:schemeClr val="tx1"/>
                 </a:solidFill>
@@ -6222,7 +5996,7 @@
           <a:lstStyle/>
           <a:p>
             <a:pPr algn="ctr"/>
-            <a:endParaRPr lang="zh-CN" altLang="en-US" sz="2000" b="1" dirty="0" smtClean="0">
+            <a:endParaRPr lang="zh-CN" altLang="en-US" sz="2000" b="1" dirty="0">
               <a:solidFill>
                 <a:schemeClr val="tx1"/>
               </a:solidFill>
@@ -6279,7 +6053,7 @@
           <a:lstStyle/>
           <a:p>
             <a:pPr algn="ctr"/>
-            <a:endParaRPr lang="zh-CN" altLang="en-US" sz="2000" b="1" dirty="0" smtClean="0">
+            <a:endParaRPr lang="zh-CN" altLang="en-US" sz="2000" b="1" dirty="0">
               <a:solidFill>
                 <a:schemeClr val="tx1"/>
               </a:solidFill>
@@ -6336,7 +6110,7 @@
           <a:lstStyle/>
           <a:p>
             <a:pPr algn="ctr"/>
-            <a:endParaRPr lang="zh-CN" altLang="en-US" sz="2000" b="1" dirty="0" smtClean="0">
+            <a:endParaRPr lang="zh-CN" altLang="en-US" sz="2000" b="1" dirty="0">
               <a:solidFill>
                 <a:schemeClr val="tx1"/>
               </a:solidFill>
@@ -6393,7 +6167,7 @@
           <a:lstStyle/>
           <a:p>
             <a:pPr algn="ctr"/>
-            <a:endParaRPr lang="zh-CN" altLang="en-US" sz="2000" b="1" dirty="0" smtClean="0">
+            <a:endParaRPr lang="zh-CN" altLang="en-US" sz="2000" b="1" dirty="0">
               <a:solidFill>
                 <a:schemeClr val="tx1"/>
               </a:solidFill>
@@ -6450,7 +6224,7 @@
           <a:lstStyle/>
           <a:p>
             <a:pPr algn="ctr"/>
-            <a:endParaRPr lang="zh-CN" altLang="en-US" sz="2000" b="1" dirty="0" smtClean="0">
+            <a:endParaRPr lang="zh-CN" altLang="en-US" sz="2000" b="1" dirty="0">
               <a:solidFill>
                 <a:schemeClr val="tx1"/>
               </a:solidFill>
@@ -6507,7 +6281,7 @@
           <a:lstStyle/>
           <a:p>
             <a:pPr algn="ctr"/>
-            <a:endParaRPr lang="zh-CN" altLang="en-US" sz="2000" b="1" dirty="0" smtClean="0">
+            <a:endParaRPr lang="zh-CN" altLang="en-US" sz="2000" b="1" dirty="0">
               <a:solidFill>
                 <a:schemeClr val="tx1"/>
               </a:solidFill>
@@ -6564,7 +6338,7 @@
           <a:lstStyle/>
           <a:p>
             <a:pPr algn="ctr"/>
-            <a:endParaRPr lang="zh-CN" altLang="en-US" sz="2000" b="1" dirty="0" smtClean="0">
+            <a:endParaRPr lang="zh-CN" altLang="en-US" sz="2000" b="1" dirty="0">
               <a:solidFill>
                 <a:schemeClr val="tx1"/>
               </a:solidFill>
@@ -6621,7 +6395,7 @@
           <a:lstStyle/>
           <a:p>
             <a:pPr algn="ctr"/>
-            <a:endParaRPr lang="zh-CN" altLang="en-US" sz="2000" b="1" dirty="0" smtClean="0">
+            <a:endParaRPr lang="zh-CN" altLang="en-US" sz="2000" b="1" dirty="0">
               <a:solidFill>
                 <a:schemeClr val="tx1"/>
               </a:solidFill>
@@ -6678,7 +6452,7 @@
           <a:lstStyle/>
           <a:p>
             <a:pPr algn="ctr"/>
-            <a:endParaRPr lang="zh-CN" altLang="en-US" sz="2000" b="1" dirty="0" smtClean="0">
+            <a:endParaRPr lang="zh-CN" altLang="en-US" sz="2000" b="1" dirty="0">
               <a:solidFill>
                 <a:schemeClr val="tx1"/>
               </a:solidFill>
@@ -6731,7 +6505,7 @@
           <a:p>
             <a:pPr algn="ctr"/>
             <a:r>
-              <a:rPr lang="en-US" altLang="zh-CN" b="1" dirty="0" smtClean="0">
+              <a:rPr lang="en-US" altLang="zh-CN" b="1" dirty="0">
                 <a:solidFill>
                   <a:schemeClr val="tx1"/>
                 </a:solidFill>
@@ -6793,7 +6567,7 @@
           <a:p>
             <a:pPr algn="ctr"/>
             <a:r>
-              <a:rPr lang="en-US" altLang="zh-CN" b="1" dirty="0" smtClean="0">
+              <a:rPr lang="en-US" altLang="zh-CN" b="1" dirty="0">
                 <a:solidFill>
                   <a:schemeClr val="tx1"/>
                 </a:solidFill>
@@ -6995,7 +6769,7 @@
           <a:p>
             <a:pPr algn="ctr"/>
             <a:r>
-              <a:rPr lang="en-US" altLang="zh-CN" b="1" dirty="0" smtClean="0">
+              <a:rPr lang="en-US" altLang="zh-CN" b="1" dirty="0">
                 <a:solidFill>
                   <a:schemeClr val="tx1"/>
                 </a:solidFill>
@@ -7154,7 +6928,7 @@
           <a:lstStyle/>
           <a:p>
             <a:r>
-              <a:rPr lang="en-US" altLang="zh-CN" dirty="0" smtClean="0"/>
+              <a:rPr lang="en-US" altLang="zh-CN" dirty="0"/>
               <a:t>print</a:t>
             </a:r>
             <a:endParaRPr lang="zh-CN" altLang="en-US" dirty="0"/>
@@ -7184,7 +6958,7 @@
           <a:lstStyle/>
           <a:p>
             <a:r>
-              <a:rPr lang="en-US" altLang="zh-CN" dirty="0" smtClean="0"/>
+              <a:rPr lang="en-US" altLang="zh-CN" dirty="0"/>
               <a:t>1</a:t>
             </a:r>
             <a:endParaRPr lang="zh-CN" altLang="en-US" dirty="0"/>
@@ -7201,13 +6975,6 @@
   <p:clrMapOvr>
     <a:masterClrMapping/>
   </p:clrMapOvr>
-  <p:timing>
-    <p:tnLst>
-      <p:par>
-        <p:cTn id="1" dur="indefinite" restart="never" nodeType="tmRoot"/>
-      </p:par>
-    </p:tnLst>
-  </p:timing>
 </p:sld>
 </file>
 

</xml_diff>

<commit_message>
+ Update 20200620 issue
</commit_message>
<xml_diff>
--- a/cs-seminar/算法与数据结构/树/树.pptx
+++ b/cs-seminar/算法与数据结构/树/树.pptx
@@ -5,7 +5,7 @@
     <p:sldMasterId id="2147483648" r:id="rId1"/>
   </p:sldMasterIdLst>
   <p:notesMasterIdLst>
-    <p:notesMasterId r:id="rId15"/>
+    <p:notesMasterId r:id="rId13"/>
   </p:notesMasterIdLst>
   <p:sldIdLst>
     <p:sldId id="256" r:id="rId2"/>
@@ -18,9 +18,7 @@
     <p:sldId id="265" r:id="rId9"/>
     <p:sldId id="263" r:id="rId10"/>
     <p:sldId id="268" r:id="rId11"/>
-    <p:sldId id="261" r:id="rId12"/>
-    <p:sldId id="267" r:id="rId13"/>
-    <p:sldId id="269" r:id="rId14"/>
+    <p:sldId id="269" r:id="rId12"/>
   </p:sldIdLst>
   <p:sldSz cx="12192000" cy="6858000"/>
   <p:notesSz cx="6858000" cy="9144000"/>
@@ -209,7 +207,7 @@
           <a:p>
             <a:fld id="{9C395F08-296D-4F57-99DE-4DE9612FD2E8}" type="datetimeFigureOut">
               <a:rPr lang="zh-CN" altLang="en-US" smtClean="0"/>
-              <a:t>2020/6/8</a:t>
+              <a:t>2020/6/13</a:t>
             </a:fld>
             <a:endParaRPr lang="zh-CN" altLang="en-US"/>
           </a:p>
@@ -610,7 +608,7 @@
           <a:p>
             <a:fld id="{70DE98D0-9A98-4B82-9573-1B9E451B3DD8}" type="datetime1">
               <a:rPr lang="zh-CN" altLang="en-US" smtClean="0"/>
-              <a:t>2020/6/8</a:t>
+              <a:t>2020/6/13</a:t>
             </a:fld>
             <a:endParaRPr lang="zh-CN" altLang="en-US"/>
           </a:p>
@@ -782,7 +780,7 @@
           <a:p>
             <a:fld id="{CAD6EDDE-8258-4135-98D1-138C89A7D11F}" type="datetime1">
               <a:rPr lang="zh-CN" altLang="en-US" smtClean="0"/>
-              <a:t>2020/6/8</a:t>
+              <a:t>2020/6/13</a:t>
             </a:fld>
             <a:endParaRPr lang="zh-CN" altLang="en-US"/>
           </a:p>
@@ -964,7 +962,7 @@
           <a:p>
             <a:fld id="{A4F786FF-FC21-41E5-B843-4724DBB978DB}" type="datetime1">
               <a:rPr lang="zh-CN" altLang="en-US" smtClean="0"/>
-              <a:t>2020/6/8</a:t>
+              <a:t>2020/6/13</a:t>
             </a:fld>
             <a:endParaRPr lang="zh-CN" altLang="en-US"/>
           </a:p>
@@ -1443,7 +1441,7 @@
           <a:p>
             <a:fld id="{6A3DF257-FFF4-43D3-A734-023879B918D0}" type="datetime1">
               <a:rPr lang="zh-CN" altLang="en-US" smtClean="0"/>
-              <a:t>2020/6/8</a:t>
+              <a:t>2020/6/13</a:t>
             </a:fld>
             <a:endParaRPr lang="zh-CN" altLang="en-US"/>
           </a:p>
@@ -1676,7 +1674,7 @@
           <a:p>
             <a:fld id="{558E8501-F9B5-4D99-BE36-F931E4F74C2A}" type="datetime1">
               <a:rPr lang="zh-CN" altLang="en-US" smtClean="0"/>
-              <a:t>2020/6/8</a:t>
+              <a:t>2020/6/13</a:t>
             </a:fld>
             <a:endParaRPr lang="zh-CN" altLang="en-US"/>
           </a:p>
@@ -2044,7 +2042,7 @@
           <a:p>
             <a:fld id="{290F56E6-87CB-4499-B353-DB44E8B6FDF1}" type="datetime1">
               <a:rPr lang="zh-CN" altLang="en-US" smtClean="0"/>
-              <a:t>2020/6/8</a:t>
+              <a:t>2020/6/13</a:t>
             </a:fld>
             <a:endParaRPr lang="zh-CN" altLang="en-US"/>
           </a:p>
@@ -2165,7 +2163,7 @@
           <a:p>
             <a:fld id="{3ADCBD56-D48A-4982-A9C5-6E7E68182A52}" type="datetime1">
               <a:rPr lang="zh-CN" altLang="en-US" smtClean="0"/>
-              <a:t>2020/6/8</a:t>
+              <a:t>2020/6/13</a:t>
             </a:fld>
             <a:endParaRPr lang="zh-CN" altLang="en-US"/>
           </a:p>
@@ -2264,7 +2262,7 @@
           <a:p>
             <a:fld id="{BE83D10E-741F-4194-B7A0-87FEF338E493}" type="datetime1">
               <a:rPr lang="zh-CN" altLang="en-US" smtClean="0"/>
-              <a:t>2020/6/8</a:t>
+              <a:t>2020/6/13</a:t>
             </a:fld>
             <a:endParaRPr lang="zh-CN" altLang="en-US"/>
           </a:p>
@@ -2543,7 +2541,7 @@
           <a:p>
             <a:fld id="{3BDB64AC-4CDF-4D37-8EE1-BC1891535049}" type="datetime1">
               <a:rPr lang="zh-CN" altLang="en-US" smtClean="0"/>
-              <a:t>2020/6/8</a:t>
+              <a:t>2020/6/13</a:t>
             </a:fld>
             <a:endParaRPr lang="zh-CN" altLang="en-US"/>
           </a:p>
@@ -2799,7 +2797,7 @@
           <a:p>
             <a:fld id="{A57B5AE3-5035-4FBD-9579-809DCC9BC55E}" type="datetime1">
               <a:rPr lang="zh-CN" altLang="en-US" smtClean="0"/>
-              <a:t>2020/6/8</a:t>
+              <a:t>2020/6/13</a:t>
             </a:fld>
             <a:endParaRPr lang="zh-CN" altLang="en-US"/>
           </a:p>
@@ -3014,7 +3012,7 @@
           <a:p>
             <a:fld id="{9FF488AB-DBA9-432E-8968-8C1072E4CA37}" type="datetime1">
               <a:rPr lang="zh-CN" altLang="en-US" smtClean="0"/>
-              <a:t>2020/6/8</a:t>
+              <a:t>2020/6/13</a:t>
             </a:fld>
             <a:endParaRPr lang="zh-CN" altLang="en-US"/>
           </a:p>
@@ -3600,15 +3598,22 @@
           </a:p>
           <a:p>
             <a:r>
-              <a:rPr lang="zh-CN" altLang="en-US" dirty="0"/>
+              <a:rPr lang="zh-CN" altLang="en-US" strike="sngStrike" dirty="0"/>
               <a:t>前序的莫里斯</a:t>
             </a:r>
+            <a:endParaRPr lang="en-US" altLang="zh-CN" strike="sngStrike" dirty="0"/>
+          </a:p>
+          <a:p>
+            <a:r>
+              <a:rPr lang="zh-CN" altLang="en-US" dirty="0"/>
+              <a:t>中序的栈实现</a:t>
+            </a:r>
             <a:endParaRPr lang="en-US" altLang="zh-CN" dirty="0"/>
           </a:p>
           <a:p>
             <a:r>
               <a:rPr lang="zh-CN" altLang="en-US" dirty="0"/>
-              <a:t>中序的栈实现</a:t>
+              <a:t>层次遍历</a:t>
             </a:r>
           </a:p>
         </p:txBody>
@@ -3684,15 +3689,7 @@
           <a:p>
             <a:r>
               <a:rPr lang="zh-CN" altLang="en-US" dirty="0"/>
-              <a:t>深搜 </a:t>
-            </a:r>
-            <a:r>
-              <a:rPr lang="en-US" altLang="zh-CN" dirty="0"/>
-              <a:t>vs </a:t>
-            </a:r>
-            <a:r>
-              <a:rPr lang="zh-CN" altLang="en-US" dirty="0"/>
-              <a:t>广搜</a:t>
+              <a:t>例题选讲</a:t>
             </a:r>
           </a:p>
         </p:txBody>
@@ -3712,6 +3709,57 @@
           <a:bodyPr/>
           <a:lstStyle/>
           <a:p>
+            <a:r>
+              <a:rPr lang="zh-CN" altLang="en-US" dirty="0">
+                <a:hlinkClick r:id="rId2"/>
+              </a:rPr>
+              <a:t>重建二叉树</a:t>
+            </a:r>
+            <a:endParaRPr lang="en-US" altLang="zh-CN" dirty="0"/>
+          </a:p>
+          <a:p>
+            <a:r>
+              <a:rPr lang="zh-CN" altLang="en-US" dirty="0">
+                <a:hlinkClick r:id="rId3"/>
+              </a:rPr>
+              <a:t>二叉树与双向链表</a:t>
+            </a:r>
+            <a:endParaRPr lang="en-US" altLang="zh-CN" dirty="0"/>
+          </a:p>
+          <a:p>
+            <a:r>
+              <a:rPr lang="zh-CN" altLang="en-US" dirty="0">
+                <a:hlinkClick r:id="rId4"/>
+              </a:rPr>
+              <a:t>二叉搜索树的后序遍历序列</a:t>
+            </a:r>
+            <a:endParaRPr lang="en-US" altLang="zh-CN" dirty="0"/>
+          </a:p>
+          <a:p>
+            <a:r>
+              <a:rPr lang="zh-CN" altLang="en-US">
+                <a:hlinkClick r:id="rId5"/>
+              </a:rPr>
+              <a:t>二</a:t>
+            </a:r>
+            <a:r>
+              <a:rPr lang="zh-CN" altLang="en-US" dirty="0">
+                <a:hlinkClick r:id="rId5"/>
+              </a:rPr>
+              <a:t>叉搜索树的第</a:t>
+            </a:r>
+            <a:r>
+              <a:rPr lang="en-US" altLang="zh-CN" dirty="0">
+                <a:hlinkClick r:id="rId5"/>
+              </a:rPr>
+              <a:t>k</a:t>
+            </a:r>
+            <a:r>
+              <a:rPr lang="zh-CN" altLang="en-US" dirty="0">
+                <a:hlinkClick r:id="rId5"/>
+              </a:rPr>
+              <a:t>个结点</a:t>
+            </a:r>
             <a:endParaRPr lang="zh-CN" altLang="en-US" dirty="0"/>
           </a:p>
         </p:txBody>
@@ -3735,196 +3783,6 @@
               <a:rPr lang="zh-CN" altLang="en-US" smtClean="0"/>
               <a:pPr/>
               <a:t>11</a:t>
-            </a:fld>
-            <a:endParaRPr lang="zh-CN" altLang="en-US"/>
-          </a:p>
-        </p:txBody>
-      </p:sp>
-    </p:spTree>
-    <p:extLst>
-      <p:ext uri="{BB962C8B-B14F-4D97-AF65-F5344CB8AC3E}">
-        <p14:creationId xmlns:p14="http://schemas.microsoft.com/office/powerpoint/2010/main" val="2693354895"/>
-      </p:ext>
-    </p:extLst>
-  </p:cSld>
-  <p:clrMapOvr>
-    <a:masterClrMapping/>
-  </p:clrMapOvr>
-</p:sld>
-</file>
-
-<file path=ppt/slides/slide12.xml><?xml version="1.0" encoding="utf-8"?>
-<p:sld xmlns:a="http://schemas.openxmlformats.org/drawingml/2006/main" xmlns:r="http://schemas.openxmlformats.org/officeDocument/2006/relationships" xmlns:p="http://schemas.openxmlformats.org/presentationml/2006/main">
-  <p:cSld>
-    <p:spTree>
-      <p:nvGrpSpPr>
-        <p:cNvPr id="1" name=""/>
-        <p:cNvGrpSpPr/>
-        <p:nvPr/>
-      </p:nvGrpSpPr>
-      <p:grpSpPr>
-        <a:xfrm>
-          <a:off x="0" y="0"/>
-          <a:ext cx="0" cy="0"/>
-          <a:chOff x="0" y="0"/>
-          <a:chExt cx="0" cy="0"/>
-        </a:xfrm>
-      </p:grpSpPr>
-      <p:sp>
-        <p:nvSpPr>
-          <p:cNvPr id="2" name="标题 1"/>
-          <p:cNvSpPr>
-            <a:spLocks noGrp="1"/>
-          </p:cNvSpPr>
-          <p:nvPr>
-            <p:ph type="title"/>
-          </p:nvPr>
-        </p:nvSpPr>
-        <p:spPr/>
-        <p:txBody>
-          <a:bodyPr/>
-          <a:lstStyle/>
-          <a:p>
-            <a:r>
-              <a:rPr lang="zh-CN" altLang="en-US" dirty="0"/>
-              <a:t>层次遍历</a:t>
-            </a:r>
-          </a:p>
-        </p:txBody>
-      </p:sp>
-      <p:sp>
-        <p:nvSpPr>
-          <p:cNvPr id="3" name="内容占位符 2"/>
-          <p:cNvSpPr>
-            <a:spLocks noGrp="1"/>
-          </p:cNvSpPr>
-          <p:nvPr>
-            <p:ph idx="1"/>
-          </p:nvPr>
-        </p:nvSpPr>
-        <p:spPr/>
-        <p:txBody>
-          <a:bodyPr/>
-          <a:lstStyle/>
-          <a:p>
-            <a:endParaRPr lang="zh-CN" altLang="en-US"/>
-          </a:p>
-        </p:txBody>
-      </p:sp>
-      <p:sp>
-        <p:nvSpPr>
-          <p:cNvPr id="4" name="灯片编号占位符 3"/>
-          <p:cNvSpPr>
-            <a:spLocks noGrp="1"/>
-          </p:cNvSpPr>
-          <p:nvPr>
-            <p:ph type="sldNum" sz="quarter" idx="12"/>
-          </p:nvPr>
-        </p:nvSpPr>
-        <p:spPr/>
-        <p:txBody>
-          <a:bodyPr/>
-          <a:lstStyle/>
-          <a:p>
-            <a:fld id="{928BA987-2BB0-46E7-BF50-A8B14E692858}" type="slidenum">
-              <a:rPr lang="zh-CN" altLang="en-US" smtClean="0"/>
-              <a:pPr/>
-              <a:t>12</a:t>
-            </a:fld>
-            <a:endParaRPr lang="zh-CN" altLang="en-US"/>
-          </a:p>
-        </p:txBody>
-      </p:sp>
-    </p:spTree>
-    <p:extLst>
-      <p:ext uri="{BB962C8B-B14F-4D97-AF65-F5344CB8AC3E}">
-        <p14:creationId xmlns:p14="http://schemas.microsoft.com/office/powerpoint/2010/main" val="2741416123"/>
-      </p:ext>
-    </p:extLst>
-  </p:cSld>
-  <p:clrMapOvr>
-    <a:masterClrMapping/>
-  </p:clrMapOvr>
-</p:sld>
-</file>
-
-<file path=ppt/slides/slide13.xml><?xml version="1.0" encoding="utf-8"?>
-<p:sld xmlns:a="http://schemas.openxmlformats.org/drawingml/2006/main" xmlns:r="http://schemas.openxmlformats.org/officeDocument/2006/relationships" xmlns:p="http://schemas.openxmlformats.org/presentationml/2006/main">
-  <p:cSld>
-    <p:spTree>
-      <p:nvGrpSpPr>
-        <p:cNvPr id="1" name=""/>
-        <p:cNvGrpSpPr/>
-        <p:nvPr/>
-      </p:nvGrpSpPr>
-      <p:grpSpPr>
-        <a:xfrm>
-          <a:off x="0" y="0"/>
-          <a:ext cx="0" cy="0"/>
-          <a:chOff x="0" y="0"/>
-          <a:chExt cx="0" cy="0"/>
-        </a:xfrm>
-      </p:grpSpPr>
-      <p:sp>
-        <p:nvSpPr>
-          <p:cNvPr id="2" name="标题 1"/>
-          <p:cNvSpPr>
-            <a:spLocks noGrp="1"/>
-          </p:cNvSpPr>
-          <p:nvPr>
-            <p:ph type="title"/>
-          </p:nvPr>
-        </p:nvSpPr>
-        <p:spPr/>
-        <p:txBody>
-          <a:bodyPr/>
-          <a:lstStyle/>
-          <a:p>
-            <a:r>
-              <a:rPr lang="zh-CN" altLang="en-US" dirty="0"/>
-              <a:t>例题选讲</a:t>
-            </a:r>
-          </a:p>
-        </p:txBody>
-      </p:sp>
-      <p:sp>
-        <p:nvSpPr>
-          <p:cNvPr id="3" name="内容占位符 2"/>
-          <p:cNvSpPr>
-            <a:spLocks noGrp="1"/>
-          </p:cNvSpPr>
-          <p:nvPr>
-            <p:ph idx="1"/>
-          </p:nvPr>
-        </p:nvSpPr>
-        <p:spPr/>
-        <p:txBody>
-          <a:bodyPr/>
-          <a:lstStyle/>
-          <a:p>
-            <a:endParaRPr lang="zh-CN" altLang="en-US"/>
-          </a:p>
-        </p:txBody>
-      </p:sp>
-      <p:sp>
-        <p:nvSpPr>
-          <p:cNvPr id="4" name="灯片编号占位符 3"/>
-          <p:cNvSpPr>
-            <a:spLocks noGrp="1"/>
-          </p:cNvSpPr>
-          <p:nvPr>
-            <p:ph type="sldNum" sz="quarter" idx="12"/>
-          </p:nvPr>
-        </p:nvSpPr>
-        <p:spPr/>
-        <p:txBody>
-          <a:bodyPr/>
-          <a:lstStyle/>
-          <a:p>
-            <a:fld id="{928BA987-2BB0-46E7-BF50-A8B14E692858}" type="slidenum">
-              <a:rPr lang="zh-CN" altLang="en-US" smtClean="0"/>
-              <a:pPr/>
-              <a:t>13</a:t>
             </a:fld>
             <a:endParaRPr lang="zh-CN" altLang="en-US"/>
           </a:p>

</xml_diff>